<commit_message>
Updated the slide deck and demos to make them more streamlined.
</commit_message>
<xml_diff>
--- a/slides/lozano_aspnetconnections_APG201_Open_Source_Tools_Every_NET_Developer_Should_Use.pptx
+++ b/slides/lozano_aspnetconnections_APG201_Open_Source_Tools_Every_NET_Developer_Should_Use.pptx
@@ -5,10 +5,10 @@
     <p:sldMasterId id="2147483648" r:id="rId1"/>
   </p:sldMasterIdLst>
   <p:notesMasterIdLst>
-    <p:notesMasterId r:id="rId37"/>
+    <p:notesMasterId r:id="rId36"/>
   </p:notesMasterIdLst>
   <p:handoutMasterIdLst>
-    <p:handoutMasterId r:id="rId38"/>
+    <p:handoutMasterId r:id="rId37"/>
   </p:handoutMasterIdLst>
   <p:sldIdLst>
     <p:sldId id="256" r:id="rId2"/>
@@ -29,23 +29,22 @@
     <p:sldId id="303" r:id="rId17"/>
     <p:sldId id="304" r:id="rId18"/>
     <p:sldId id="305" r:id="rId19"/>
-    <p:sldId id="306" r:id="rId20"/>
-    <p:sldId id="307" r:id="rId21"/>
-    <p:sldId id="308" r:id="rId22"/>
-    <p:sldId id="309" r:id="rId23"/>
-    <p:sldId id="310" r:id="rId24"/>
+    <p:sldId id="307" r:id="rId20"/>
+    <p:sldId id="308" r:id="rId21"/>
+    <p:sldId id="309" r:id="rId22"/>
+    <p:sldId id="310" r:id="rId23"/>
+    <p:sldId id="312" r:id="rId24"/>
     <p:sldId id="311" r:id="rId25"/>
-    <p:sldId id="312" r:id="rId26"/>
-    <p:sldId id="313" r:id="rId27"/>
-    <p:sldId id="314" r:id="rId28"/>
-    <p:sldId id="315" r:id="rId29"/>
-    <p:sldId id="316" r:id="rId30"/>
-    <p:sldId id="317" r:id="rId31"/>
-    <p:sldId id="318" r:id="rId32"/>
-    <p:sldId id="319" r:id="rId33"/>
-    <p:sldId id="320" r:id="rId34"/>
-    <p:sldId id="321" r:id="rId35"/>
-    <p:sldId id="290" r:id="rId36"/>
+    <p:sldId id="313" r:id="rId26"/>
+    <p:sldId id="314" r:id="rId27"/>
+    <p:sldId id="315" r:id="rId28"/>
+    <p:sldId id="316" r:id="rId29"/>
+    <p:sldId id="317" r:id="rId30"/>
+    <p:sldId id="318" r:id="rId31"/>
+    <p:sldId id="319" r:id="rId32"/>
+    <p:sldId id="320" r:id="rId33"/>
+    <p:sldId id="321" r:id="rId34"/>
+    <p:sldId id="290" r:id="rId35"/>
   </p:sldIdLst>
   <p:sldSz cx="9144000" cy="6858000" type="screen4x3"/>
   <p:notesSz cx="6858000" cy="9144000"/>
@@ -361,7 +360,7 @@
     </p:spTree>
     <p:extLst>
       <p:ext uri="{BB962C8B-B14F-4D97-AF65-F5344CB8AC3E}">
-        <p14:creationId xmlns:p14="http://schemas.microsoft.com/office/powerpoint/2010/main" val="708096528"/>
+        <p14:creationId xmlns:p14="http://schemas.microsoft.com/office/powerpoint/2010/main" xmlns="" val="708096528"/>
       </p:ext>
     </p:extLst>
   </p:cSld>
@@ -704,7 +703,7 @@
     </p:spTree>
     <p:extLst>
       <p:ext uri="{BB962C8B-B14F-4D97-AF65-F5344CB8AC3E}">
-        <p14:creationId xmlns:p14="http://schemas.microsoft.com/office/powerpoint/2010/main" val="2540690885"/>
+        <p14:creationId xmlns:p14="http://schemas.microsoft.com/office/powerpoint/2010/main" xmlns="" val="2540690885"/>
       </p:ext>
     </p:extLst>
   </p:cSld>
@@ -1384,7 +1383,7 @@
             <a:fld id="{676EAB40-3BED-4879-909B-D791B02DA3CD}" type="slidenum">
               <a:rPr lang="en-US" smtClean="0"/>
               <a:pPr/>
-              <a:t>35</a:t>
+              <a:t>34</a:t>
             </a:fld>
             <a:endParaRPr lang="en-US" smtClean="0"/>
           </a:p>
@@ -2161,7 +2160,7 @@
     </p:spTree>
     <p:extLst>
       <p:ext uri="{BB962C8B-B14F-4D97-AF65-F5344CB8AC3E}">
-        <p14:creationId xmlns:p14="http://schemas.microsoft.com/office/powerpoint/2010/main" val="222333177"/>
+        <p14:creationId xmlns:p14="http://schemas.microsoft.com/office/powerpoint/2010/main" xmlns="" val="222333177"/>
       </p:ext>
     </p:extLst>
   </p:cSld>
@@ -5291,7 +5290,7 @@
     </p:spTree>
     <p:extLst>
       <p:ext uri="{BB962C8B-B14F-4D97-AF65-F5344CB8AC3E}">
-        <p14:creationId xmlns:p14="http://schemas.microsoft.com/office/powerpoint/2010/main" val="3377229844"/>
+        <p14:creationId xmlns:p14="http://schemas.microsoft.com/office/powerpoint/2010/main" xmlns="" val="3377229844"/>
       </p:ext>
     </p:extLst>
   </p:cSld>
@@ -5544,7 +5543,7 @@
               </a:lnSpc>
             </a:pPr>
             <a:r>
-              <a:rPr lang="en-US" sz="2400" smtClean="0"/>
+              <a:rPr lang="en-US" sz="2400" dirty="0" smtClean="0"/>
               <a:t>Impedance Mismatch between Objects and RDBMS</a:t>
             </a:r>
           </a:p>
@@ -5555,7 +5554,7 @@
               </a:lnSpc>
             </a:pPr>
             <a:r>
-              <a:rPr lang="en-US" sz="2400" smtClean="0"/>
+              <a:rPr lang="en-US" sz="2400" dirty="0" smtClean="0"/>
               <a:t>Encapsulation</a:t>
             </a:r>
           </a:p>
@@ -5566,7 +5565,7 @@
               </a:lnSpc>
             </a:pPr>
             <a:r>
-              <a:rPr lang="en-US" sz="2400" smtClean="0"/>
+              <a:rPr lang="en-US" sz="2400" dirty="0" smtClean="0"/>
               <a:t>Data type differences</a:t>
             </a:r>
           </a:p>
@@ -5577,7 +5576,7 @@
               </a:lnSpc>
             </a:pPr>
             <a:r>
-              <a:rPr lang="en-US" sz="2400" smtClean="0"/>
+              <a:rPr lang="en-US" sz="2400" dirty="0" smtClean="0"/>
               <a:t>Structural differences</a:t>
             </a:r>
           </a:p>
@@ -5588,17 +5587,16 @@
               </a:lnSpc>
             </a:pPr>
             <a:r>
-              <a:rPr lang="en-US" sz="2400" smtClean="0"/>
+              <a:rPr lang="en-US" sz="2400" dirty="0" smtClean="0"/>
               <a:t>Manipulative differences</a:t>
             </a:r>
-            <a:endParaRPr lang="en-US" sz="2400" dirty="0" smtClean="0"/>
           </a:p>
         </p:txBody>
       </p:sp>
     </p:spTree>
     <p:extLst>
       <p:ext uri="{BB962C8B-B14F-4D97-AF65-F5344CB8AC3E}">
-        <p14:creationId xmlns:p14="http://schemas.microsoft.com/office/powerpoint/2010/main" val="3897121920"/>
+        <p14:creationId xmlns:p14="http://schemas.microsoft.com/office/powerpoint/2010/main" xmlns="" val="3897121920"/>
       </p:ext>
     </p:extLst>
   </p:cSld>
@@ -5903,7 +5901,7 @@
     </p:spTree>
     <p:extLst>
       <p:ext uri="{BB962C8B-B14F-4D97-AF65-F5344CB8AC3E}">
-        <p14:creationId xmlns:p14="http://schemas.microsoft.com/office/powerpoint/2010/main" val="982756288"/>
+        <p14:creationId xmlns:p14="http://schemas.microsoft.com/office/powerpoint/2010/main" xmlns="" val="982756288"/>
       </p:ext>
     </p:extLst>
   </p:cSld>
@@ -6214,7 +6212,7 @@
     </p:spTree>
     <p:extLst>
       <p:ext uri="{BB962C8B-B14F-4D97-AF65-F5344CB8AC3E}">
-        <p14:creationId xmlns:p14="http://schemas.microsoft.com/office/powerpoint/2010/main" val="4123499011"/>
+        <p14:creationId xmlns:p14="http://schemas.microsoft.com/office/powerpoint/2010/main" xmlns="" val="4123499011"/>
       </p:ext>
     </p:extLst>
   </p:cSld>
@@ -6353,7 +6351,7 @@
     </p:spTree>
     <p:extLst>
       <p:ext uri="{BB962C8B-B14F-4D97-AF65-F5344CB8AC3E}">
-        <p14:creationId xmlns:p14="http://schemas.microsoft.com/office/powerpoint/2010/main" val="316906743"/>
+        <p14:creationId xmlns:p14="http://schemas.microsoft.com/office/powerpoint/2010/main" xmlns="" val="316906743"/>
       </p:ext>
     </p:extLst>
   </p:cSld>
@@ -6615,7 +6613,7 @@
     </p:spTree>
     <p:extLst>
       <p:ext uri="{BB962C8B-B14F-4D97-AF65-F5344CB8AC3E}">
-        <p14:creationId xmlns:p14="http://schemas.microsoft.com/office/powerpoint/2010/main" val="523166525"/>
+        <p14:creationId xmlns:p14="http://schemas.microsoft.com/office/powerpoint/2010/main" xmlns="" val="523166525"/>
       </p:ext>
     </p:extLst>
   </p:cSld>
@@ -6919,7 +6917,7 @@
     </p:spTree>
     <p:extLst>
       <p:ext uri="{BB962C8B-B14F-4D97-AF65-F5344CB8AC3E}">
-        <p14:creationId xmlns:p14="http://schemas.microsoft.com/office/powerpoint/2010/main" val="1373382243"/>
+        <p14:creationId xmlns:p14="http://schemas.microsoft.com/office/powerpoint/2010/main" xmlns="" val="1373382243"/>
       </p:ext>
     </p:extLst>
   </p:cSld>
@@ -7249,7 +7247,7 @@
     </p:spTree>
     <p:extLst>
       <p:ext uri="{BB962C8B-B14F-4D97-AF65-F5344CB8AC3E}">
-        <p14:creationId xmlns:p14="http://schemas.microsoft.com/office/powerpoint/2010/main" val="3424193903"/>
+        <p14:creationId xmlns:p14="http://schemas.microsoft.com/office/powerpoint/2010/main" xmlns="" val="3424193903"/>
       </p:ext>
     </p:extLst>
   </p:cSld>
@@ -7501,14 +7499,22 @@
               </a:lnSpc>
             </a:pPr>
             <a:r>
-              <a:rPr lang="en-US" smtClean="0"/>
-              <a:t>Inversion of Control (IoC)</a:t>
+              <a:rPr lang="en-US" dirty="0" smtClean="0"/>
+              <a:t>Inversion of Control (</a:t>
+            </a:r>
+            <a:r>
+              <a:rPr lang="en-US" dirty="0" err="1" smtClean="0"/>
+              <a:t>IoC</a:t>
+            </a:r>
+            <a:r>
+              <a:rPr lang="en-US" dirty="0" smtClean="0"/>
+              <a:t>)</a:t>
             </a:r>
           </a:p>
           <a:p>
             <a:pPr lvl="1"/>
             <a:r>
-              <a:rPr lang="en-GB" smtClean="0"/>
+              <a:rPr lang="en-GB" dirty="0" smtClean="0"/>
               <a:t>Objects rely on their environment to provide dependencies rather than actively obtaining them.</a:t>
             </a:r>
           </a:p>
@@ -7519,8 +7525,35 @@
               </a:lnSpc>
             </a:pPr>
             <a:r>
-              <a:rPr lang="en-US" smtClean="0"/>
-              <a:t>Hollywood Principle—"don't call us, we will call you".</a:t>
+              <a:rPr lang="en-US" dirty="0" smtClean="0"/>
+              <a:t>Hollywood </a:t>
+            </a:r>
+            <a:r>
+              <a:rPr lang="en-US" dirty="0" smtClean="0"/>
+              <a:t>Principle: </a:t>
+            </a:r>
+          </a:p>
+          <a:p>
+            <a:pPr lvl="2">
+              <a:lnSpc>
+                <a:spcPct val="90000"/>
+              </a:lnSpc>
+            </a:pPr>
+            <a:r>
+              <a:rPr lang="en-US" i="1" dirty="0" smtClean="0"/>
+              <a:t>Don't </a:t>
+            </a:r>
+            <a:r>
+              <a:rPr lang="en-US" i="1" dirty="0" smtClean="0"/>
+              <a:t>call us, </a:t>
+            </a:r>
+            <a:r>
+              <a:rPr lang="en-US" i="1" dirty="0" smtClean="0"/>
+              <a:t>we’ll call you</a:t>
+            </a:r>
+            <a:r>
+              <a:rPr lang="en-US" dirty="0" smtClean="0"/>
+              <a:t>.</a:t>
             </a:r>
             <a:endParaRPr lang="en-US" dirty="0" smtClean="0"/>
           </a:p>
@@ -7559,7 +7592,7 @@
     </p:spTree>
     <p:extLst>
       <p:ext uri="{BB962C8B-B14F-4D97-AF65-F5344CB8AC3E}">
-        <p14:creationId xmlns:p14="http://schemas.microsoft.com/office/powerpoint/2010/main" val="1070955464"/>
+        <p14:creationId xmlns:p14="http://schemas.microsoft.com/office/powerpoint/2010/main" xmlns="" val="1070955464"/>
       </p:ext>
     </p:extLst>
   </p:cSld>
@@ -7606,7 +7639,7 @@
         <p:spPr bwMode="auto">
           <a:xfrm>
             <a:off x="665163" y="395288"/>
-            <a:ext cx="7813675" cy="583965"/>
+            <a:ext cx="7813675" cy="609600"/>
           </a:xfrm>
           <a:ln>
             <a:noFill/>
@@ -7635,300 +7668,252 @@
       </p:sp>
       <p:sp>
         <p:nvSpPr>
-          <p:cNvPr id="5" name="TextBox 4"/>
-          <p:cNvSpPr txBox="1"/>
+          <p:cNvPr id="5" name="Text Placeholder 2"/>
+          <p:cNvSpPr txBox="1">
+            <a:spLocks/>
+          </p:cNvSpPr>
           <p:nvPr/>
         </p:nvSpPr>
-        <p:spPr>
+        <p:spPr bwMode="auto">
           <a:xfrm>
-            <a:off x="533400" y="1219200"/>
-            <a:ext cx="7772400" cy="5647700"/>
+            <a:off x="457200" y="1600201"/>
+            <a:ext cx="7423150" cy="2209800"/>
           </a:xfrm>
           <a:prstGeom prst="rect">
             <a:avLst/>
           </a:prstGeom>
           <a:noFill/>
-        </p:spPr>
-        <p:txBody>
-          <a:bodyPr wrap="square" rtlCol="0">
-            <a:spAutoFit/>
+          <a:ln w="9525">
+            <a:noFill/>
+            <a:miter lim="800000"/>
+            <a:headEnd/>
+            <a:tailEnd/>
+          </a:ln>
+        </p:spPr>
+        <p:txBody>
+          <a:bodyPr vert="horz" wrap="square" lIns="91440" tIns="45720" rIns="91440" bIns="45720" numCol="1" anchor="t" anchorCtr="0" compatLnSpc="1">
+            <a:prstTxWarp prst="textNoShape">
+              <a:avLst/>
+            </a:prstTxWarp>
+            <a:noAutofit/>
           </a:bodyPr>
-          <a:lstStyle/>
-          <a:p>
-            <a:endParaRPr lang="en-US" sz="1900" b="1" dirty="0" smtClean="0">
-              <a:latin typeface="Consolas" pitchFamily="49" charset="0"/>
-            </a:endParaRPr>
-          </a:p>
-          <a:p>
-            <a:r>
-              <a:rPr lang="en-US" sz="1900" b="1" dirty="0" smtClean="0">
-                <a:latin typeface="Consolas" pitchFamily="49" charset="0"/>
-              </a:rPr>
-              <a:t>public class </a:t>
-            </a:r>
-            <a:r>
-              <a:rPr lang="en-US" sz="1900" b="1" dirty="0" err="1" smtClean="0">
-                <a:latin typeface="Consolas" pitchFamily="49" charset="0"/>
-              </a:rPr>
-              <a:t>MyClass</a:t>
-            </a:r>
-            <a:endParaRPr lang="en-US" sz="1900" b="1" dirty="0" smtClean="0">
-              <a:latin typeface="Consolas" pitchFamily="49" charset="0"/>
-            </a:endParaRPr>
-          </a:p>
-          <a:p>
-            <a:r>
-              <a:rPr lang="en-US" sz="1900" b="1" dirty="0" smtClean="0">
-                <a:latin typeface="Consolas" pitchFamily="49" charset="0"/>
-              </a:rPr>
-              <a:t>{</a:t>
-            </a:r>
-          </a:p>
-          <a:p>
-            <a:r>
-              <a:rPr lang="en-US" sz="1900" b="1" dirty="0" smtClean="0">
-                <a:latin typeface="Consolas" pitchFamily="49" charset="0"/>
-              </a:rPr>
-              <a:t>    </a:t>
-            </a:r>
-            <a:r>
-              <a:rPr lang="en-US" sz="1900" b="1" dirty="0" err="1" smtClean="0">
-                <a:latin typeface="Consolas" pitchFamily="49" charset="0"/>
-              </a:rPr>
-              <a:t>IFoo</a:t>
-            </a:r>
-            <a:r>
-              <a:rPr lang="en-US" sz="1900" b="1" dirty="0" smtClean="0">
-                <a:latin typeface="Consolas" pitchFamily="49" charset="0"/>
-              </a:rPr>
-              <a:t> </a:t>
-            </a:r>
-            <a:r>
-              <a:rPr lang="en-US" sz="1900" b="1" dirty="0" err="1" smtClean="0">
-                <a:latin typeface="Consolas" pitchFamily="49" charset="0"/>
-              </a:rPr>
-              <a:t>myFoo</a:t>
-            </a:r>
-            <a:r>
-              <a:rPr lang="en-US" sz="1900" b="1" dirty="0" smtClean="0">
-                <a:latin typeface="Consolas" pitchFamily="49" charset="0"/>
-              </a:rPr>
-              <a:t>;</a:t>
-            </a:r>
-          </a:p>
-          <a:p>
-            <a:endParaRPr lang="en-US" sz="1900" b="1" dirty="0" smtClean="0">
-              <a:latin typeface="Consolas" pitchFamily="49" charset="0"/>
-            </a:endParaRPr>
-          </a:p>
-          <a:p>
-            <a:r>
-              <a:rPr lang="en-US" sz="1900" b="1" dirty="0" smtClean="0">
-                <a:latin typeface="Consolas" pitchFamily="49" charset="0"/>
-              </a:rPr>
-              <a:t>    public </a:t>
-            </a:r>
-            <a:r>
-              <a:rPr lang="en-US" sz="1900" b="1" dirty="0" err="1" smtClean="0">
-                <a:latin typeface="Consolas" pitchFamily="49" charset="0"/>
-              </a:rPr>
-              <a:t>MyClass</a:t>
-            </a:r>
-            <a:r>
-              <a:rPr lang="en-US" sz="1900" b="1" dirty="0" smtClean="0">
-                <a:latin typeface="Consolas" pitchFamily="49" charset="0"/>
-              </a:rPr>
-              <a:t>(</a:t>
-            </a:r>
-            <a:r>
-              <a:rPr lang="en-US" sz="1900" b="1" dirty="0" err="1" smtClean="0">
-                <a:latin typeface="Consolas" pitchFamily="49" charset="0"/>
-              </a:rPr>
-              <a:t>IFoo</a:t>
-            </a:r>
-            <a:r>
-              <a:rPr lang="en-US" sz="1900" b="1" dirty="0" smtClean="0">
-                <a:latin typeface="Consolas" pitchFamily="49" charset="0"/>
-              </a:rPr>
-              <a:t> </a:t>
-            </a:r>
-            <a:r>
-              <a:rPr lang="en-US" sz="1900" b="1" dirty="0" err="1" smtClean="0">
-                <a:latin typeface="Consolas" pitchFamily="49" charset="0"/>
-              </a:rPr>
-              <a:t>foo</a:t>
-            </a:r>
-            <a:r>
-              <a:rPr lang="en-US" sz="1900" b="1" dirty="0" smtClean="0">
-                <a:latin typeface="Consolas" pitchFamily="49" charset="0"/>
-              </a:rPr>
-              <a:t>)</a:t>
-            </a:r>
-          </a:p>
-          <a:p>
-            <a:r>
-              <a:rPr lang="en-US" sz="1900" b="1" dirty="0" smtClean="0">
-                <a:latin typeface="Consolas" pitchFamily="49" charset="0"/>
-              </a:rPr>
-              <a:t>    {</a:t>
-            </a:r>
-          </a:p>
-          <a:p>
-            <a:r>
-              <a:rPr lang="en-US" sz="1900" b="1" dirty="0" smtClean="0">
-                <a:latin typeface="Consolas" pitchFamily="49" charset="0"/>
-              </a:rPr>
-              <a:t>        </a:t>
-            </a:r>
-            <a:r>
-              <a:rPr lang="en-US" sz="1900" b="1" dirty="0" err="1" smtClean="0">
-                <a:latin typeface="Consolas" pitchFamily="49" charset="0"/>
-              </a:rPr>
-              <a:t>myFoo</a:t>
-            </a:r>
-            <a:r>
-              <a:rPr lang="en-US" sz="1900" b="1" dirty="0" smtClean="0">
-                <a:latin typeface="Consolas" pitchFamily="49" charset="0"/>
-              </a:rPr>
-              <a:t> = </a:t>
-            </a:r>
-            <a:r>
-              <a:rPr lang="en-US" sz="1900" b="1" dirty="0" err="1" smtClean="0">
-                <a:latin typeface="Consolas" pitchFamily="49" charset="0"/>
-              </a:rPr>
-              <a:t>foo</a:t>
-            </a:r>
-            <a:r>
-              <a:rPr lang="en-US" sz="1900" b="1" dirty="0" smtClean="0">
-                <a:latin typeface="Consolas" pitchFamily="49" charset="0"/>
-              </a:rPr>
-              <a:t>;</a:t>
-            </a:r>
-          </a:p>
-          <a:p>
-            <a:r>
-              <a:rPr lang="en-US" sz="1900" b="1" dirty="0" smtClean="0">
-                <a:latin typeface="Consolas" pitchFamily="49" charset="0"/>
-              </a:rPr>
-              <a:t>    }</a:t>
-            </a:r>
-          </a:p>
-          <a:p>
-            <a:endParaRPr lang="en-US" sz="1900" b="1" dirty="0" smtClean="0">
-              <a:latin typeface="Consolas" pitchFamily="49" charset="0"/>
-            </a:endParaRPr>
-          </a:p>
-          <a:p>
-            <a:r>
-              <a:rPr lang="en-US" sz="1900" b="1" dirty="0" smtClean="0">
-                <a:latin typeface="Consolas" pitchFamily="49" charset="0"/>
-              </a:rPr>
-              <a:t>    public void </a:t>
-            </a:r>
-            <a:r>
-              <a:rPr lang="en-US" sz="1900" b="1" dirty="0" err="1" smtClean="0">
-                <a:latin typeface="Consolas" pitchFamily="49" charset="0"/>
-              </a:rPr>
-              <a:t>DoWork</a:t>
-            </a:r>
-            <a:r>
-              <a:rPr lang="en-US" sz="1900" b="1" dirty="0" smtClean="0">
-                <a:latin typeface="Consolas" pitchFamily="49" charset="0"/>
-              </a:rPr>
-              <a:t>()</a:t>
-            </a:r>
-          </a:p>
-          <a:p>
-            <a:r>
-              <a:rPr lang="en-US" sz="1900" b="1" dirty="0" smtClean="0">
-                <a:latin typeface="Consolas" pitchFamily="49" charset="0"/>
-              </a:rPr>
-              <a:t>    {</a:t>
-            </a:r>
-          </a:p>
-          <a:p>
-            <a:r>
-              <a:rPr lang="en-US" sz="1900" b="1" dirty="0" smtClean="0">
-                <a:latin typeface="Consolas" pitchFamily="49" charset="0"/>
-              </a:rPr>
-              <a:t>        if(</a:t>
-            </a:r>
-            <a:r>
-              <a:rPr lang="en-US" sz="1900" b="1" dirty="0" err="1" smtClean="0">
-                <a:latin typeface="Consolas" pitchFamily="49" charset="0"/>
-              </a:rPr>
-              <a:t>myFoo</a:t>
-            </a:r>
-            <a:r>
-              <a:rPr lang="en-US" sz="1900" b="1" dirty="0" smtClean="0">
-                <a:latin typeface="Consolas" pitchFamily="49" charset="0"/>
-              </a:rPr>
-              <a:t> != null)</a:t>
-            </a:r>
-          </a:p>
-          <a:p>
-            <a:r>
-              <a:rPr lang="en-US" sz="1900" b="1" dirty="0" smtClean="0">
-                <a:latin typeface="Consolas" pitchFamily="49" charset="0"/>
-              </a:rPr>
-              <a:t>        {</a:t>
-            </a:r>
-          </a:p>
-          <a:p>
-            <a:r>
-              <a:rPr lang="en-US" sz="1900" b="1" dirty="0" smtClean="0">
-                <a:latin typeface="Consolas" pitchFamily="49" charset="0"/>
-              </a:rPr>
-              <a:t>            </a:t>
-            </a:r>
-            <a:r>
-              <a:rPr lang="en-US" sz="1900" b="1" dirty="0" err="1" smtClean="0">
-                <a:latin typeface="Consolas" pitchFamily="49" charset="0"/>
-              </a:rPr>
-              <a:t>myFoo.DoBar</a:t>
-            </a:r>
-            <a:r>
-              <a:rPr lang="en-US" sz="1900" b="1" dirty="0" smtClean="0">
-                <a:latin typeface="Consolas" pitchFamily="49" charset="0"/>
-              </a:rPr>
-              <a:t>();</a:t>
-            </a:r>
-          </a:p>
-          <a:p>
-            <a:r>
-              <a:rPr lang="en-US" sz="1900" b="1" dirty="0" smtClean="0">
-                <a:latin typeface="Consolas" pitchFamily="49" charset="0"/>
-              </a:rPr>
-              <a:t>        }</a:t>
-            </a:r>
-          </a:p>
-          <a:p>
-            <a:r>
-              <a:rPr lang="en-US" sz="1900" b="1" dirty="0" smtClean="0">
-                <a:latin typeface="Consolas" pitchFamily="49" charset="0"/>
-              </a:rPr>
-              <a:t>    }</a:t>
-            </a:r>
-          </a:p>
-          <a:p>
-            <a:r>
-              <a:rPr lang="en-US" sz="1900" b="1" dirty="0" smtClean="0">
-                <a:latin typeface="Consolas" pitchFamily="49" charset="0"/>
-              </a:rPr>
-              <a:t>}</a:t>
-            </a:r>
-          </a:p>
-          <a:p>
-            <a:endParaRPr lang="en-US" sz="1900" b="1" dirty="0">
-              <a:latin typeface="Consolas" pitchFamily="49" charset="0"/>
-            </a:endParaRPr>
+          <a:lstStyle>
+            <a:lvl1pPr marL="342900" indent="-342900" algn="l" rtl="0" eaLnBrk="0" fontAlgn="base" hangingPunct="0">
+              <a:spcBef>
+                <a:spcPct val="20000"/>
+              </a:spcBef>
+              <a:spcAft>
+                <a:spcPct val="0"/>
+              </a:spcAft>
+              <a:buChar char="•"/>
+              <a:defRPr sz="3200">
+                <a:solidFill>
+                  <a:srgbClr val="FFFF66"/>
+                </a:solidFill>
+                <a:latin typeface="+mn-lt"/>
+                <a:ea typeface="+mn-ea"/>
+                <a:cs typeface="+mn-cs"/>
+              </a:defRPr>
+            </a:lvl1pPr>
+            <a:lvl2pPr marL="742950" indent="-285750" algn="l" rtl="0" eaLnBrk="0" fontAlgn="base" hangingPunct="0">
+              <a:spcBef>
+                <a:spcPct val="20000"/>
+              </a:spcBef>
+              <a:spcAft>
+                <a:spcPct val="0"/>
+              </a:spcAft>
+              <a:buSzPct val="75000"/>
+              <a:buFont typeface="Arial" charset="0"/>
+              <a:buChar char="●"/>
+              <a:defRPr sz="2800">
+                <a:solidFill>
+                  <a:schemeClr val="tx1"/>
+                </a:solidFill>
+                <a:latin typeface="+mn-lt"/>
+              </a:defRPr>
+            </a:lvl2pPr>
+            <a:lvl3pPr marL="1143000" indent="-228600" algn="l" rtl="0" eaLnBrk="0" fontAlgn="base" hangingPunct="0">
+              <a:spcBef>
+                <a:spcPct val="20000"/>
+              </a:spcBef>
+              <a:spcAft>
+                <a:spcPct val="0"/>
+              </a:spcAft>
+              <a:buChar char="•"/>
+              <a:defRPr sz="2400">
+                <a:solidFill>
+                  <a:srgbClr val="FFFF66"/>
+                </a:solidFill>
+                <a:latin typeface="+mn-lt"/>
+              </a:defRPr>
+            </a:lvl3pPr>
+            <a:lvl4pPr marL="1600200" indent="-228600" algn="l" rtl="0" eaLnBrk="0" fontAlgn="base" hangingPunct="0">
+              <a:spcBef>
+                <a:spcPct val="20000"/>
+              </a:spcBef>
+              <a:spcAft>
+                <a:spcPct val="0"/>
+              </a:spcAft>
+              <a:buChar char="–"/>
+              <a:defRPr sz="2000">
+                <a:solidFill>
+                  <a:schemeClr val="tx1"/>
+                </a:solidFill>
+                <a:latin typeface="+mn-lt"/>
+              </a:defRPr>
+            </a:lvl4pPr>
+            <a:lvl5pPr marL="2057400" indent="-228600" algn="l" rtl="0" eaLnBrk="0" fontAlgn="base" hangingPunct="0">
+              <a:spcBef>
+                <a:spcPct val="20000"/>
+              </a:spcBef>
+              <a:spcAft>
+                <a:spcPct val="0"/>
+              </a:spcAft>
+              <a:buChar char="»"/>
+              <a:defRPr sz="2000">
+                <a:solidFill>
+                  <a:srgbClr val="FFFF66"/>
+                </a:solidFill>
+                <a:latin typeface="+mn-lt"/>
+              </a:defRPr>
+            </a:lvl5pPr>
+            <a:lvl6pPr marL="2514600" indent="-228600" algn="l" rtl="0" fontAlgn="base">
+              <a:spcBef>
+                <a:spcPct val="20000"/>
+              </a:spcBef>
+              <a:spcAft>
+                <a:spcPct val="0"/>
+              </a:spcAft>
+              <a:buChar char="»"/>
+              <a:defRPr sz="2000">
+                <a:solidFill>
+                  <a:srgbClr val="FFFF66"/>
+                </a:solidFill>
+                <a:latin typeface="+mn-lt"/>
+              </a:defRPr>
+            </a:lvl6pPr>
+            <a:lvl7pPr marL="2971800" indent="-228600" algn="l" rtl="0" fontAlgn="base">
+              <a:spcBef>
+                <a:spcPct val="20000"/>
+              </a:spcBef>
+              <a:spcAft>
+                <a:spcPct val="0"/>
+              </a:spcAft>
+              <a:buChar char="»"/>
+              <a:defRPr sz="2000">
+                <a:solidFill>
+                  <a:srgbClr val="FFFF66"/>
+                </a:solidFill>
+                <a:latin typeface="+mn-lt"/>
+              </a:defRPr>
+            </a:lvl7pPr>
+            <a:lvl8pPr marL="3429000" indent="-228600" algn="l" rtl="0" fontAlgn="base">
+              <a:spcBef>
+                <a:spcPct val="20000"/>
+              </a:spcBef>
+              <a:spcAft>
+                <a:spcPct val="0"/>
+              </a:spcAft>
+              <a:buChar char="»"/>
+              <a:defRPr sz="2000">
+                <a:solidFill>
+                  <a:srgbClr val="FFFF66"/>
+                </a:solidFill>
+                <a:latin typeface="+mn-lt"/>
+              </a:defRPr>
+            </a:lvl8pPr>
+            <a:lvl9pPr marL="3886200" indent="-228600" algn="l" rtl="0" fontAlgn="base">
+              <a:spcBef>
+                <a:spcPct val="20000"/>
+              </a:spcBef>
+              <a:spcAft>
+                <a:spcPct val="0"/>
+              </a:spcAft>
+              <a:buChar char="»"/>
+              <a:defRPr sz="2000">
+                <a:solidFill>
+                  <a:srgbClr val="FFFF66"/>
+                </a:solidFill>
+                <a:latin typeface="+mn-lt"/>
+              </a:defRPr>
+            </a:lvl9pPr>
+          </a:lstStyle>
+          <a:p>
+            <a:pPr>
+              <a:lnSpc>
+                <a:spcPct val="90000"/>
+              </a:lnSpc>
+            </a:pPr>
+            <a:r>
+              <a:rPr lang="en-US" sz="2400" dirty="0" smtClean="0"/>
+              <a:t>Why all the trouble?</a:t>
+            </a:r>
+          </a:p>
+          <a:p>
+            <a:pPr lvl="1"/>
+            <a:r>
+              <a:rPr lang="en-GB" sz="2400" dirty="0" smtClean="0"/>
+              <a:t>Simpler component architecture</a:t>
+            </a:r>
+          </a:p>
+          <a:p>
+            <a:pPr lvl="1"/>
+            <a:r>
+              <a:rPr lang="en-GB" sz="2400" dirty="0" smtClean="0"/>
+              <a:t>Reduced cost of change</a:t>
+            </a:r>
+          </a:p>
+          <a:p>
+            <a:pPr lvl="1"/>
+            <a:r>
+              <a:rPr lang="en-GB" sz="2400" dirty="0" smtClean="0"/>
+              <a:t>Transparency</a:t>
+            </a:r>
+          </a:p>
+          <a:p>
+            <a:pPr lvl="1"/>
+            <a:r>
+              <a:rPr lang="en-GB" sz="2400" dirty="0" smtClean="0"/>
+              <a:t>Easy to </a:t>
+            </a:r>
+            <a:r>
+              <a:rPr lang="en-GB" sz="2400" dirty="0" smtClean="0"/>
+              <a:t>unit </a:t>
+            </a:r>
+            <a:r>
+              <a:rPr lang="en-GB" sz="2400" dirty="0" smtClean="0"/>
+              <a:t>test</a:t>
+            </a:r>
+          </a:p>
+          <a:p>
+            <a:pPr lvl="1"/>
+            <a:r>
+              <a:rPr lang="en-GB" sz="2400" dirty="0" smtClean="0"/>
+              <a:t>Easily move between application configurations</a:t>
+            </a:r>
+          </a:p>
+          <a:p>
+            <a:pPr>
+              <a:lnSpc>
+                <a:spcPct val="90000"/>
+              </a:lnSpc>
+            </a:pPr>
+            <a:endParaRPr lang="en-US" sz="2400" dirty="0" smtClean="0"/>
+          </a:p>
+          <a:p>
+            <a:pPr>
+              <a:lnSpc>
+                <a:spcPct val="90000"/>
+              </a:lnSpc>
+            </a:pPr>
+            <a:endParaRPr lang="en-US" sz="2400" dirty="0" smtClean="0"/>
           </a:p>
         </p:txBody>
       </p:sp>
     </p:spTree>
     <p:extLst>
       <p:ext uri="{BB962C8B-B14F-4D97-AF65-F5344CB8AC3E}">
-        <p14:creationId xmlns:p14="http://schemas.microsoft.com/office/powerpoint/2010/main" val="2656126156"/>
+        <p14:creationId xmlns:p14="http://schemas.microsoft.com/office/powerpoint/2010/main" xmlns="" val="3493512876"/>
       </p:ext>
     </p:extLst>
   </p:cSld>
@@ -8193,11 +8178,7 @@
             </a:pPr>
             <a:r>
               <a:rPr lang="en-US" sz="2400" dirty="0" smtClean="0"/>
-              <a:t>Data </a:t>
-            </a:r>
-            <a:r>
-              <a:rPr lang="en-US" sz="2400" dirty="0" smtClean="0"/>
-              <a:t>Tooling</a:t>
+              <a:t>Data Tooling</a:t>
             </a:r>
           </a:p>
           <a:p>
@@ -8257,7 +8238,7 @@
     </p:spTree>
     <p:extLst>
       <p:ext uri="{BB962C8B-B14F-4D97-AF65-F5344CB8AC3E}">
-        <p14:creationId xmlns:p14="http://schemas.microsoft.com/office/powerpoint/2010/main" val="93419966"/>
+        <p14:creationId xmlns:p14="http://schemas.microsoft.com/office/powerpoint/2010/main" xmlns="" val="93419966"/>
       </p:ext>
     </p:extLst>
   </p:cSld>
@@ -8341,8 +8322,8 @@
         </p:nvSpPr>
         <p:spPr bwMode="auto">
           <a:xfrm>
-            <a:off x="457200" y="1600201"/>
-            <a:ext cx="7423150" cy="2209800"/>
+            <a:off x="457200" y="1600200"/>
+            <a:ext cx="7423150" cy="4800599"/>
           </a:xfrm>
           <a:prstGeom prst="rect">
             <a:avLst/>
@@ -8360,7 +8341,6 @@
             <a:prstTxWarp prst="textNoShape">
               <a:avLst/>
             </a:prstTxWarp>
-            <a:noAutofit/>
           </a:bodyPr>
           <a:lstStyle>
             <a:lvl1pPr marL="342900" indent="-342900" algn="l" rtl="0" eaLnBrk="0" fontAlgn="base" hangingPunct="0">
@@ -8510,67 +8490,107 @@
               </a:lnSpc>
             </a:pPr>
             <a:r>
-              <a:rPr lang="en-US" sz="2400" smtClean="0"/>
-              <a:t>Why all the trouble?</a:t>
-            </a:r>
-          </a:p>
-          <a:p>
-            <a:pPr lvl="1"/>
-            <a:r>
-              <a:rPr lang="en-GB" sz="2400" smtClean="0"/>
-              <a:t>Simpler component architecture</a:t>
-            </a:r>
-          </a:p>
-          <a:p>
-            <a:pPr lvl="1"/>
-            <a:r>
-              <a:rPr lang="en-GB" sz="2400" smtClean="0"/>
-              <a:t>Reduced cost of change</a:t>
-            </a:r>
-          </a:p>
-          <a:p>
-            <a:pPr lvl="1"/>
-            <a:r>
-              <a:rPr lang="en-GB" sz="2400" smtClean="0"/>
-              <a:t>Transparency</a:t>
-            </a:r>
-          </a:p>
-          <a:p>
-            <a:pPr lvl="1"/>
-            <a:r>
-              <a:rPr lang="en-GB" sz="2400" smtClean="0"/>
-              <a:t>Easy to aunit test</a:t>
-            </a:r>
-          </a:p>
-          <a:p>
-            <a:pPr lvl="1"/>
-            <a:r>
-              <a:rPr lang="en-GB" sz="2400" smtClean="0"/>
-              <a:t>Easily move between application configurations</a:t>
-            </a:r>
-          </a:p>
-          <a:p>
-            <a:pPr>
+              <a:rPr lang="en-US" sz="2400" dirty="0" smtClean="0"/>
+              <a:t>Windsor / </a:t>
+            </a:r>
+            <a:r>
+              <a:rPr lang="en-US" sz="2400" dirty="0" err="1" smtClean="0"/>
+              <a:t>MicroKernel</a:t>
+            </a:r>
+            <a:r>
+              <a:rPr lang="en-US" sz="2400" dirty="0" smtClean="0"/>
+              <a:t> - www.castleproject.org</a:t>
+            </a:r>
+          </a:p>
+          <a:p>
+            <a:pPr lvl="1">
               <a:lnSpc>
                 <a:spcPct val="90000"/>
               </a:lnSpc>
             </a:pPr>
-            <a:endParaRPr lang="en-US" sz="2400" smtClean="0"/>
-          </a:p>
-          <a:p>
-            <a:pPr>
+            <a:r>
+              <a:rPr lang="en-US" sz="2400" dirty="0" smtClean="0"/>
+              <a:t>Part of the Castle Project </a:t>
+            </a:r>
+            <a:endParaRPr lang="en-US" sz="2400" dirty="0" smtClean="0"/>
+          </a:p>
+          <a:p>
+            <a:pPr lvl="2">
               <a:lnSpc>
                 <a:spcPct val="90000"/>
               </a:lnSpc>
             </a:pPr>
-            <a:endParaRPr lang="en-US" sz="2400" dirty="0" smtClean="0"/>
+            <a:r>
+              <a:rPr lang="en-US" sz="2000" dirty="0" err="1" smtClean="0"/>
+              <a:t>MonoRail</a:t>
+            </a:r>
+            <a:endParaRPr lang="en-US" sz="2000" dirty="0" smtClean="0"/>
+          </a:p>
+          <a:p>
+            <a:pPr lvl="2">
+              <a:lnSpc>
+                <a:spcPct val="90000"/>
+              </a:lnSpc>
+            </a:pPr>
+            <a:r>
+              <a:rPr lang="en-US" sz="2000" dirty="0" err="1" smtClean="0"/>
+              <a:t>ActiveRecord</a:t>
+            </a:r>
+            <a:endParaRPr lang="en-US" sz="2000" dirty="0" smtClean="0"/>
+          </a:p>
+          <a:p>
+            <a:pPr lvl="1">
+              <a:lnSpc>
+                <a:spcPct val="90000"/>
+              </a:lnSpc>
+            </a:pPr>
+            <a:r>
+              <a:rPr lang="en-GB" sz="2400" dirty="0" smtClean="0"/>
+              <a:t>Created by Hamilton </a:t>
+            </a:r>
+            <a:r>
+              <a:rPr lang="en-GB" sz="2400" dirty="0" err="1" smtClean="0"/>
+              <a:t>Verissimo</a:t>
+            </a:r>
+            <a:r>
+              <a:rPr lang="en-GB" sz="2400" dirty="0" smtClean="0"/>
+              <a:t>  </a:t>
+            </a:r>
+            <a:endParaRPr lang="en-GB" sz="2400" dirty="0" smtClean="0"/>
+          </a:p>
+          <a:p>
+            <a:pPr lvl="2">
+              <a:lnSpc>
+                <a:spcPct val="90000"/>
+              </a:lnSpc>
+            </a:pPr>
+            <a:r>
+              <a:rPr lang="en-GB" sz="2000" dirty="0" smtClean="0"/>
+              <a:t>PM for Managed Extensibility Framework (MEF)</a:t>
+            </a:r>
+            <a:endParaRPr lang="en-GB" sz="2000" dirty="0" smtClean="0"/>
+          </a:p>
+          <a:p>
+            <a:pPr lvl="1">
+              <a:lnSpc>
+                <a:spcPct val="90000"/>
+              </a:lnSpc>
+            </a:pPr>
+            <a:r>
+              <a:rPr lang="en-GB" sz="2400" dirty="0" err="1" smtClean="0"/>
+              <a:t>MicroKernel</a:t>
+            </a:r>
+            <a:r>
+              <a:rPr lang="en-GB" sz="2400" dirty="0" smtClean="0"/>
+              <a:t> is the base implementation of the container</a:t>
+            </a:r>
           </a:p>
         </p:txBody>
       </p:sp>
     </p:spTree>
     <p:extLst>
       <p:ext uri="{BB962C8B-B14F-4D97-AF65-F5344CB8AC3E}">
-        <p14:creationId xmlns:p14="http://schemas.microsoft.com/office/powerpoint/2010/main" val="3493512876"/>
+        <p14:creationId xmlns:p14="http://schemas.microsoft.com/office/powerpoint/2010/main" xmlns="" val="4261101757"/>
       </p:ext>
     </p:extLst>
   </p:cSld>
@@ -8833,8 +8853,8 @@
               </a:lnSpc>
             </a:pPr>
             <a:r>
-              <a:rPr lang="en-US" sz="2400" smtClean="0"/>
-              <a:t>Part of the Castle Project (MonoRail, ActiveRecord)</a:t>
+              <a:rPr lang="en-GB" sz="2400" smtClean="0"/>
+              <a:t>Windsor is the facade of the core with a simpler interface</a:t>
             </a:r>
           </a:p>
           <a:p>
@@ -8844,8 +8864,8 @@
               </a:lnSpc>
             </a:pPr>
             <a:r>
-              <a:rPr lang="en-GB" sz="2400" smtClean="0"/>
-              <a:t>Created by Hamilton Verissimo  (now a Softie working MEF)</a:t>
+              <a:rPr lang="en-US" sz="2400" smtClean="0"/>
+              <a:t>Windsor handles the configuration, proxies, automatic configuration and facilities.</a:t>
             </a:r>
           </a:p>
           <a:p>
@@ -8855,17 +8875,27 @@
               </a:lnSpc>
             </a:pPr>
             <a:r>
-              <a:rPr lang="en-GB" sz="2400" smtClean="0"/>
-              <a:t>MicroKernel is the base implementation of the container</a:t>
-            </a:r>
-            <a:endParaRPr lang="en-GB" sz="2400" dirty="0" smtClean="0"/>
+              <a:rPr lang="en-US" sz="2400" smtClean="0"/>
+              <a:t>Under the Apache License</a:t>
+            </a:r>
+            <a:endParaRPr lang="en-GB" sz="2400" smtClean="0"/>
+          </a:p>
+          <a:p>
+            <a:pPr>
+              <a:lnSpc>
+                <a:spcPct val="90000"/>
+              </a:lnSpc>
+              <a:buFontTx/>
+              <a:buNone/>
+            </a:pPr>
+            <a:endParaRPr lang="en-US" sz="2400" dirty="0" smtClean="0"/>
           </a:p>
         </p:txBody>
       </p:sp>
     </p:spTree>
     <p:extLst>
       <p:ext uri="{BB962C8B-B14F-4D97-AF65-F5344CB8AC3E}">
-        <p14:creationId xmlns:p14="http://schemas.microsoft.com/office/powerpoint/2010/main" val="4261101757"/>
+        <p14:creationId xmlns:p14="http://schemas.microsoft.com/office/powerpoint/2010/main" xmlns="" val="3495733333"/>
       </p:ext>
     </p:extLst>
   </p:cSld>
@@ -8934,7 +8964,7 @@
             </a:pPr>
             <a:r>
               <a:rPr lang="en-US" dirty="0" smtClean="0"/>
-              <a:t>Architectural Tooling</a:t>
+              <a:t>Demo</a:t>
             </a:r>
           </a:p>
         </p:txBody>
@@ -8949,8 +8979,8 @@
         </p:nvSpPr>
         <p:spPr bwMode="auto">
           <a:xfrm>
-            <a:off x="457200" y="1600200"/>
-            <a:ext cx="7423150" cy="4800599"/>
+            <a:off x="533400" y="3140075"/>
+            <a:ext cx="7924800" cy="577850"/>
           </a:xfrm>
           <a:prstGeom prst="rect">
             <a:avLst/>
@@ -8964,10 +8994,11 @@
           </a:ln>
         </p:spPr>
         <p:txBody>
-          <a:bodyPr vert="horz" wrap="square" lIns="91440" tIns="45720" rIns="91440" bIns="45720" numCol="1" anchor="t" anchorCtr="0" compatLnSpc="1">
+          <a:bodyPr vert="horz" wrap="square" lIns="91440" tIns="45720" rIns="91440" bIns="45720" numCol="1" anchor="ctr" anchorCtr="0" compatLnSpc="1">
             <a:prstTxWarp prst="textNoShape">
               <a:avLst/>
             </a:prstTxWarp>
+            <a:normAutofit lnSpcReduction="10000"/>
           </a:bodyPr>
           <a:lstStyle>
             <a:lvl1pPr marL="342900" indent="-342900" algn="l" rtl="0" eaLnBrk="0" fontAlgn="base" hangingPunct="0">
@@ -9111,66 +9142,22 @@
             </a:lvl9pPr>
           </a:lstStyle>
           <a:p>
-            <a:pPr>
-              <a:lnSpc>
-                <a:spcPct val="90000"/>
-              </a:lnSpc>
-            </a:pPr>
-            <a:r>
-              <a:rPr lang="en-US" sz="2400" smtClean="0"/>
-              <a:t>Windsor / MicroKernel - www.castleproject.org</a:t>
-            </a:r>
-          </a:p>
-          <a:p>
-            <a:pPr lvl="1">
-              <a:lnSpc>
-                <a:spcPct val="90000"/>
-              </a:lnSpc>
-            </a:pPr>
-            <a:r>
-              <a:rPr lang="en-GB" sz="2400" smtClean="0"/>
-              <a:t>Windsor is the facade of the core with a simpler interface</a:t>
-            </a:r>
-          </a:p>
-          <a:p>
-            <a:pPr lvl="1">
-              <a:lnSpc>
-                <a:spcPct val="90000"/>
-              </a:lnSpc>
-            </a:pPr>
-            <a:r>
-              <a:rPr lang="en-US" sz="2400" smtClean="0"/>
-              <a:t>Windsor handles the configuration, proxies, automatic configuration and facilities.</a:t>
-            </a:r>
-          </a:p>
-          <a:p>
-            <a:pPr lvl="1">
-              <a:lnSpc>
-                <a:spcPct val="90000"/>
-              </a:lnSpc>
-            </a:pPr>
-            <a:r>
-              <a:rPr lang="en-US" sz="2400" smtClean="0"/>
-              <a:t>Under the Apache License</a:t>
-            </a:r>
-            <a:endParaRPr lang="en-GB" sz="2400" smtClean="0"/>
-          </a:p>
-          <a:p>
-            <a:pPr>
-              <a:lnSpc>
-                <a:spcPct val="90000"/>
-              </a:lnSpc>
-              <a:buFontTx/>
+            <a:pPr algn="ctr">
+              <a:buFont typeface="Wingdings" pitchFamily="-64" charset="2"/>
               <a:buNone/>
             </a:pPr>
-            <a:endParaRPr lang="en-US" sz="2400" dirty="0" smtClean="0"/>
+            <a:r>
+              <a:rPr lang="en-US" smtClean="0"/>
+              <a:t>Castle Windsor Overview</a:t>
+            </a:r>
+            <a:endParaRPr lang="en-US" dirty="0" smtClean="0"/>
           </a:p>
         </p:txBody>
       </p:sp>
     </p:spTree>
     <p:extLst>
       <p:ext uri="{BB962C8B-B14F-4D97-AF65-F5344CB8AC3E}">
-        <p14:creationId xmlns:p14="http://schemas.microsoft.com/office/powerpoint/2010/main" val="3495733333"/>
+        <p14:creationId xmlns:p14="http://schemas.microsoft.com/office/powerpoint/2010/main" xmlns="" val="682757112"/>
       </p:ext>
     </p:extLst>
   </p:cSld>
@@ -9239,7 +9226,7 @@
             </a:pPr>
             <a:r>
               <a:rPr lang="en-US" dirty="0" smtClean="0"/>
-              <a:t>Demo</a:t>
+              <a:t>Instrumentation Tooling</a:t>
             </a:r>
           </a:p>
         </p:txBody>
@@ -9254,8 +9241,8 @@
         </p:nvSpPr>
         <p:spPr bwMode="auto">
           <a:xfrm>
-            <a:off x="533400" y="3140075"/>
-            <a:ext cx="7924800" cy="577850"/>
+            <a:off x="457200" y="1600201"/>
+            <a:ext cx="7423150" cy="2209800"/>
           </a:xfrm>
           <a:prstGeom prst="rect">
             <a:avLst/>
@@ -9269,11 +9256,11 @@
           </a:ln>
         </p:spPr>
         <p:txBody>
-          <a:bodyPr vert="horz" wrap="square" lIns="91440" tIns="45720" rIns="91440" bIns="45720" numCol="1" anchor="ctr" anchorCtr="0" compatLnSpc="1">
+          <a:bodyPr vert="horz" wrap="square" lIns="91440" tIns="45720" rIns="91440" bIns="45720" numCol="1" anchor="t" anchorCtr="0" compatLnSpc="1">
             <a:prstTxWarp prst="textNoShape">
               <a:avLst/>
             </a:prstTxWarp>
-            <a:normAutofit lnSpcReduction="10000"/>
+            <a:noAutofit/>
           </a:bodyPr>
           <a:lstStyle>
             <a:lvl1pPr marL="342900" indent="-342900" algn="l" rtl="0" eaLnBrk="0" fontAlgn="base" hangingPunct="0">
@@ -9417,22 +9404,73 @@
             </a:lvl9pPr>
           </a:lstStyle>
           <a:p>
-            <a:pPr algn="ctr">
-              <a:buFont typeface="Wingdings" pitchFamily="-64" charset="2"/>
-              <a:buNone/>
-            </a:pPr>
-            <a:r>
-              <a:rPr lang="en-US" smtClean="0"/>
-              <a:t>Castle Windsor Overview</a:t>
-            </a:r>
-            <a:endParaRPr lang="en-US" dirty="0" smtClean="0"/>
+            <a:r>
+              <a:rPr lang="en-US" sz="2400" dirty="0" smtClean="0"/>
+              <a:t>Got log?</a:t>
+            </a:r>
+          </a:p>
+          <a:p>
+            <a:pPr lvl="1"/>
+            <a:r>
+              <a:rPr lang="en-US" sz="2400" dirty="0" err="1" smtClean="0"/>
+              <a:t>System.Diagnostics.Trace</a:t>
+            </a:r>
+            <a:r>
+              <a:rPr lang="en-US" sz="2400" dirty="0" smtClean="0"/>
+              <a:t> + </a:t>
+            </a:r>
+            <a:r>
+              <a:rPr lang="en-US" sz="2400" dirty="0" err="1" smtClean="0"/>
+              <a:t>TextWriter</a:t>
+            </a:r>
+            <a:endParaRPr lang="en-US" sz="2400" dirty="0" smtClean="0"/>
+          </a:p>
+          <a:p>
+            <a:pPr lvl="1"/>
+            <a:r>
+              <a:rPr lang="en-US" sz="2400" dirty="0" err="1" smtClean="0"/>
+              <a:t>System.Console.Write</a:t>
+            </a:r>
+            <a:endParaRPr lang="en-US" sz="2400" dirty="0" smtClean="0"/>
+          </a:p>
+          <a:p>
+            <a:pPr lvl="1"/>
+            <a:r>
+              <a:rPr lang="en-US" sz="2400" dirty="0" err="1" smtClean="0"/>
+              <a:t>EventLog</a:t>
+            </a:r>
+            <a:endParaRPr lang="en-US" sz="2400" dirty="0" smtClean="0"/>
+          </a:p>
+          <a:p>
+            <a:pPr lvl="1"/>
+            <a:r>
+              <a:rPr lang="en-US" sz="2400" dirty="0" smtClean="0"/>
+              <a:t>Yellow Screen of Death (YSD)</a:t>
+            </a:r>
+            <a:endParaRPr lang="en-US" sz="2400" dirty="0" smtClean="0"/>
+          </a:p>
+          <a:p>
+            <a:pPr lvl="1"/>
+            <a:r>
+              <a:rPr lang="en-US" sz="2400" dirty="0" smtClean="0"/>
+              <a:t>Log?  We need no </a:t>
+            </a:r>
+            <a:r>
+              <a:rPr lang="en-US" sz="2400" dirty="0" err="1" smtClean="0"/>
+              <a:t>stinkin</a:t>
+            </a:r>
+            <a:r>
+              <a:rPr lang="en-US" sz="2400" dirty="0" smtClean="0"/>
+              <a:t>’ log!</a:t>
+            </a:r>
+            <a:endParaRPr lang="en-US" sz="2400" dirty="0"/>
           </a:p>
         </p:txBody>
       </p:sp>
     </p:spTree>
     <p:extLst>
       <p:ext uri="{BB962C8B-B14F-4D97-AF65-F5344CB8AC3E}">
-        <p14:creationId xmlns:p14="http://schemas.microsoft.com/office/powerpoint/2010/main" val="682757112"/>
+        <p14:creationId xmlns:p14="http://schemas.microsoft.com/office/powerpoint/2010/main" xmlns="" val="4189590685"/>
       </p:ext>
     </p:extLst>
   </p:cSld>
@@ -9718,7 +9756,7 @@
     </p:spTree>
     <p:extLst>
       <p:ext uri="{BB962C8B-B14F-4D97-AF65-F5344CB8AC3E}">
-        <p14:creationId xmlns:p14="http://schemas.microsoft.com/office/powerpoint/2010/main" val="2480587184"/>
+        <p14:creationId xmlns:p14="http://schemas.microsoft.com/office/powerpoint/2010/main" xmlns="" val="2480587184"/>
       </p:ext>
     </p:extLst>
   </p:cSld>
@@ -9802,8 +9840,8 @@
         </p:nvSpPr>
         <p:spPr bwMode="auto">
           <a:xfrm>
-            <a:off x="457200" y="1600201"/>
-            <a:ext cx="7423150" cy="2209800"/>
+            <a:off x="457200" y="1600200"/>
+            <a:ext cx="7423150" cy="4495799"/>
           </a:xfrm>
           <a:prstGeom prst="rect">
             <a:avLst/>
@@ -9821,7 +9859,7 @@
             <a:prstTxWarp prst="textNoShape">
               <a:avLst/>
             </a:prstTxWarp>
-            <a:noAutofit/>
+            <a:normAutofit/>
           </a:bodyPr>
           <a:lstStyle>
             <a:lvl1pPr marL="342900" indent="-342900" algn="l" rtl="0" eaLnBrk="0" fontAlgn="base" hangingPunct="0">
@@ -9967,44 +10005,40 @@
           <a:p>
             <a:r>
               <a:rPr lang="en-US" sz="2400" smtClean="0"/>
-              <a:t>Got log?</a:t>
+              <a:t>Log4net -- logging.apache.org</a:t>
             </a:r>
           </a:p>
           <a:p>
             <a:pPr lvl="1"/>
             <a:r>
               <a:rPr lang="en-US" sz="2400" smtClean="0"/>
-              <a:t>System.Diagnostics.Trace + TextWriter</a:t>
+              <a:t>Declarative formatting of trace output / Filtering</a:t>
             </a:r>
           </a:p>
           <a:p>
             <a:pPr lvl="1"/>
             <a:r>
               <a:rPr lang="en-US" sz="2400" smtClean="0"/>
-              <a:t>System.Console.Write</a:t>
+              <a:t>Reconfiguration on the fly (no process restart)</a:t>
             </a:r>
           </a:p>
           <a:p>
             <a:pPr lvl="1"/>
             <a:r>
               <a:rPr lang="en-US" sz="2400" smtClean="0"/>
-              <a:t>EventLog</a:t>
+              <a:t>Under the Apache License</a:t>
             </a:r>
           </a:p>
           <a:p>
             <a:pPr lvl="1"/>
-            <a:r>
-              <a:rPr lang="en-US" sz="2400" smtClean="0"/>
-              <a:t>Log?  We need no stinkin’ log!</a:t>
-            </a:r>
-            <a:endParaRPr lang="en-US" sz="2400" dirty="0"/>
+            <a:endParaRPr lang="en-US" sz="2400" dirty="0" smtClean="0"/>
           </a:p>
         </p:txBody>
       </p:sp>
     </p:spTree>
     <p:extLst>
       <p:ext uri="{BB962C8B-B14F-4D97-AF65-F5344CB8AC3E}">
-        <p14:creationId xmlns:p14="http://schemas.microsoft.com/office/powerpoint/2010/main" val="4189590685"/>
+        <p14:creationId xmlns:p14="http://schemas.microsoft.com/office/powerpoint/2010/main" xmlns="" val="55120761"/>
       </p:ext>
     </p:extLst>
   </p:cSld>
@@ -10073,7 +10107,7 @@
             </a:pPr>
             <a:r>
               <a:rPr lang="en-US" dirty="0" smtClean="0"/>
-              <a:t>Instrumentation Tooling</a:t>
+              <a:t>Demo</a:t>
             </a:r>
           </a:p>
         </p:txBody>
@@ -10088,8 +10122,8 @@
         </p:nvSpPr>
         <p:spPr bwMode="auto">
           <a:xfrm>
-            <a:off x="457200" y="1600200"/>
-            <a:ext cx="7423150" cy="4495799"/>
+            <a:off x="533400" y="3140075"/>
+            <a:ext cx="7924800" cy="577850"/>
           </a:xfrm>
           <a:prstGeom prst="rect">
             <a:avLst/>
@@ -10103,11 +10137,11 @@
           </a:ln>
         </p:spPr>
         <p:txBody>
-          <a:bodyPr vert="horz" wrap="square" lIns="91440" tIns="45720" rIns="91440" bIns="45720" numCol="1" anchor="t" anchorCtr="0" compatLnSpc="1">
+          <a:bodyPr vert="horz" wrap="square" lIns="91440" tIns="45720" rIns="91440" bIns="45720" numCol="1" anchor="ctr" anchorCtr="0" compatLnSpc="1">
             <a:prstTxWarp prst="textNoShape">
               <a:avLst/>
             </a:prstTxWarp>
-            <a:normAutofit/>
+            <a:normAutofit lnSpcReduction="10000"/>
           </a:bodyPr>
           <a:lstStyle>
             <a:lvl1pPr marL="342900" indent="-342900" algn="l" rtl="0" eaLnBrk="0" fontAlgn="base" hangingPunct="0">
@@ -10251,42 +10285,22 @@
             </a:lvl9pPr>
           </a:lstStyle>
           <a:p>
-            <a:r>
-              <a:rPr lang="en-US" sz="2400" smtClean="0"/>
-              <a:t>Log4net -- logging.apache.org</a:t>
-            </a:r>
-          </a:p>
-          <a:p>
-            <a:pPr lvl="1"/>
-            <a:r>
-              <a:rPr lang="en-US" sz="2400" smtClean="0"/>
-              <a:t>Declarative formatting of trace output / Filtering</a:t>
-            </a:r>
-          </a:p>
-          <a:p>
-            <a:pPr lvl="1"/>
-            <a:r>
-              <a:rPr lang="en-US" sz="2400" smtClean="0"/>
-              <a:t>Reconfiguration on the fly (no process restart)</a:t>
-            </a:r>
-          </a:p>
-          <a:p>
-            <a:pPr lvl="1"/>
-            <a:r>
-              <a:rPr lang="en-US" sz="2400" smtClean="0"/>
-              <a:t>Under the Apache License</a:t>
-            </a:r>
-          </a:p>
-          <a:p>
-            <a:pPr lvl="1"/>
-            <a:endParaRPr lang="en-US" sz="2400" dirty="0" smtClean="0"/>
+            <a:pPr algn="ctr">
+              <a:buFont typeface="Wingdings" pitchFamily="-64" charset="2"/>
+              <a:buNone/>
+            </a:pPr>
+            <a:r>
+              <a:rPr lang="en-US" smtClean="0"/>
+              <a:t>log4net Overview</a:t>
+            </a:r>
+            <a:endParaRPr lang="en-US" dirty="0" smtClean="0"/>
           </a:p>
         </p:txBody>
       </p:sp>
     </p:spTree>
     <p:extLst>
       <p:ext uri="{BB962C8B-B14F-4D97-AF65-F5344CB8AC3E}">
-        <p14:creationId xmlns:p14="http://schemas.microsoft.com/office/powerpoint/2010/main" val="55120761"/>
+        <p14:creationId xmlns:p14="http://schemas.microsoft.com/office/powerpoint/2010/main" xmlns="" val="1693305713"/>
       </p:ext>
     </p:extLst>
   </p:cSld>
@@ -10355,7 +10369,7 @@
             </a:pPr>
             <a:r>
               <a:rPr lang="en-US" dirty="0" smtClean="0"/>
-              <a:t>Demo</a:t>
+              <a:t>Testing Tooling</a:t>
             </a:r>
           </a:p>
         </p:txBody>
@@ -10370,8 +10384,8 @@
         </p:nvSpPr>
         <p:spPr bwMode="auto">
           <a:xfrm>
-            <a:off x="533400" y="3140075"/>
-            <a:ext cx="7924800" cy="577850"/>
+            <a:off x="457200" y="1600200"/>
+            <a:ext cx="7423150" cy="1904999"/>
           </a:xfrm>
           <a:prstGeom prst="rect">
             <a:avLst/>
@@ -10385,11 +10399,11 @@
           </a:ln>
         </p:spPr>
         <p:txBody>
-          <a:bodyPr vert="horz" wrap="square" lIns="91440" tIns="45720" rIns="91440" bIns="45720" numCol="1" anchor="ctr" anchorCtr="0" compatLnSpc="1">
+          <a:bodyPr vert="horz" wrap="square" lIns="91440" tIns="45720" rIns="91440" bIns="45720" numCol="1" anchor="t" anchorCtr="0" compatLnSpc="1">
             <a:prstTxWarp prst="textNoShape">
               <a:avLst/>
             </a:prstTxWarp>
-            <a:normAutofit lnSpcReduction="10000"/>
+            <a:noAutofit/>
           </a:bodyPr>
           <a:lstStyle>
             <a:lvl1pPr marL="342900" indent="-342900" algn="l" rtl="0" eaLnBrk="0" fontAlgn="base" hangingPunct="0">
@@ -10533,22 +10547,95 @@
             </a:lvl9pPr>
           </a:lstStyle>
           <a:p>
-            <a:pPr algn="ctr">
-              <a:buFont typeface="Wingdings" pitchFamily="-64" charset="2"/>
-              <a:buNone/>
-            </a:pPr>
-            <a:r>
-              <a:rPr lang="en-US" smtClean="0"/>
-              <a:t>log4net Overview</a:t>
-            </a:r>
+            <a:pPr>
+              <a:lnSpc>
+                <a:spcPct val="90000"/>
+              </a:lnSpc>
+            </a:pPr>
+            <a:r>
+              <a:rPr lang="en-US" sz="2400" smtClean="0"/>
+              <a:t>Unit Testing</a:t>
+            </a:r>
+          </a:p>
+          <a:p>
+            <a:pPr lvl="1">
+              <a:lnSpc>
+                <a:spcPct val="90000"/>
+              </a:lnSpc>
+            </a:pPr>
+            <a:r>
+              <a:rPr lang="en-US" sz="2400" smtClean="0"/>
+              <a:t>A method of testing that verifies the individual units of source code are working properly. </a:t>
+            </a:r>
+          </a:p>
+          <a:p>
+            <a:pPr lvl="1">
+              <a:lnSpc>
+                <a:spcPct val="90000"/>
+              </a:lnSpc>
+            </a:pPr>
+            <a:r>
+              <a:rPr lang="en-US" sz="2400" smtClean="0"/>
+              <a:t>Smallest testable part of an application.</a:t>
+            </a:r>
+          </a:p>
+          <a:p>
+            <a:pPr lvl="1">
+              <a:lnSpc>
+                <a:spcPct val="90000"/>
+              </a:lnSpc>
+            </a:pPr>
+            <a:r>
+              <a:rPr lang="en-US" sz="2400" smtClean="0"/>
+              <a:t>Is NOT Test Driven Development (TDD)</a:t>
+            </a:r>
+          </a:p>
+          <a:p>
+            <a:pPr lvl="2">
+              <a:lnSpc>
+                <a:spcPct val="90000"/>
+              </a:lnSpc>
+              <a:buFont typeface="Arial" pitchFamily="34" charset="0"/>
+              <a:buChar char="•"/>
+            </a:pPr>
             <a:endParaRPr lang="en-US" dirty="0" smtClean="0"/>
+          </a:p>
+        </p:txBody>
+      </p:sp>
+      <p:sp>
+        <p:nvSpPr>
+          <p:cNvPr id="6" name="TextBox 5"/>
+          <p:cNvSpPr txBox="1"/>
+          <p:nvPr/>
+        </p:nvSpPr>
+        <p:spPr>
+          <a:xfrm>
+            <a:off x="3352800" y="4572000"/>
+            <a:ext cx="4532010" cy="369332"/>
+          </a:xfrm>
+          <a:prstGeom prst="rect">
+            <a:avLst/>
+          </a:prstGeom>
+          <a:noFill/>
+        </p:spPr>
+        <p:txBody>
+          <a:bodyPr wrap="none" rtlCol="0">
+            <a:spAutoFit/>
+          </a:bodyPr>
+          <a:lstStyle/>
+          <a:p>
+            <a:r>
+              <a:rPr lang="en-US" sz="1800" b="1" dirty="0" smtClean="0"/>
+              <a:t>http://en.wikipedia.org/wiki/Unit_testing</a:t>
+            </a:r>
+            <a:endParaRPr lang="en-US" sz="1800" b="1" dirty="0"/>
           </a:p>
         </p:txBody>
       </p:sp>
     </p:spTree>
     <p:extLst>
       <p:ext uri="{BB962C8B-B14F-4D97-AF65-F5344CB8AC3E}">
-        <p14:creationId xmlns:p14="http://schemas.microsoft.com/office/powerpoint/2010/main" val="1693305713"/>
+        <p14:creationId xmlns:p14="http://schemas.microsoft.com/office/powerpoint/2010/main" xmlns="" val="4080939389"/>
       </p:ext>
     </p:extLst>
   </p:cSld>
@@ -10632,8 +10719,8 @@
         </p:nvSpPr>
         <p:spPr bwMode="auto">
           <a:xfrm>
-            <a:off x="457200" y="1600200"/>
-            <a:ext cx="7423150" cy="1904999"/>
+            <a:off x="457200" y="1600201"/>
+            <a:ext cx="7423150" cy="2514600"/>
           </a:xfrm>
           <a:prstGeom prst="rect">
             <a:avLst/>
@@ -10802,40 +10889,42 @@
             </a:pPr>
             <a:r>
               <a:rPr lang="en-US" sz="2400" smtClean="0"/>
-              <a:t>Unit Testing</a:t>
-            </a:r>
-          </a:p>
-          <a:p>
-            <a:pPr lvl="1">
-              <a:lnSpc>
-                <a:spcPct val="90000"/>
-              </a:lnSpc>
-            </a:pPr>
+              <a:t>Unit testing helps you …</a:t>
+            </a:r>
+          </a:p>
+          <a:p>
+            <a:pPr lvl="1"/>
+            <a:r>
+              <a:rPr lang="nb-NO" sz="2400" smtClean="0"/>
+              <a:t>Try before you buy</a:t>
+            </a:r>
+          </a:p>
+          <a:p>
+            <a:pPr lvl="1"/>
+            <a:r>
+              <a:rPr lang="nb-NO" sz="2400" smtClean="0"/>
+              <a:t>Find bugs</a:t>
+            </a:r>
+          </a:p>
+          <a:p>
+            <a:pPr lvl="1"/>
+            <a:r>
+              <a:rPr lang="nb-NO" sz="2400" smtClean="0"/>
+              <a:t>Maintain the application</a:t>
+            </a:r>
+          </a:p>
+          <a:p>
+            <a:pPr lvl="1"/>
+            <a:r>
+              <a:rPr lang="nb-NO" sz="2400" smtClean="0"/>
+              <a:t>Understand and document the application</a:t>
+            </a:r>
+          </a:p>
+          <a:p>
+            <a:pPr lvl="1"/>
             <a:r>
               <a:rPr lang="en-US" sz="2400" smtClean="0"/>
-              <a:t>A method of testing that verifies the individual units of source code are working properly. </a:t>
-            </a:r>
-          </a:p>
-          <a:p>
-            <a:pPr lvl="1">
-              <a:lnSpc>
-                <a:spcPct val="90000"/>
-              </a:lnSpc>
-            </a:pPr>
-            <a:r>
-              <a:rPr lang="en-US" sz="2400" smtClean="0"/>
-              <a:t>Smallest testable part of an application.</a:t>
-            </a:r>
-          </a:p>
-          <a:p>
-            <a:pPr lvl="1">
-              <a:lnSpc>
-                <a:spcPct val="90000"/>
-              </a:lnSpc>
-            </a:pPr>
-            <a:r>
-              <a:rPr lang="en-US" sz="2400" smtClean="0"/>
-              <a:t>Is NOT Test Driven Development (TDD)</a:t>
+              <a:t>Develop new pieces for the application</a:t>
             </a:r>
           </a:p>
           <a:p>
@@ -10850,40 +10939,10 @@
           </a:p>
         </p:txBody>
       </p:sp>
-      <p:sp>
-        <p:nvSpPr>
-          <p:cNvPr id="6" name="TextBox 5"/>
-          <p:cNvSpPr txBox="1"/>
-          <p:nvPr/>
-        </p:nvSpPr>
-        <p:spPr>
-          <a:xfrm>
-            <a:off x="3352800" y="4572000"/>
-            <a:ext cx="4532010" cy="369332"/>
-          </a:xfrm>
-          <a:prstGeom prst="rect">
-            <a:avLst/>
-          </a:prstGeom>
-          <a:noFill/>
-        </p:spPr>
-        <p:txBody>
-          <a:bodyPr wrap="none" rtlCol="0">
-            <a:spAutoFit/>
-          </a:bodyPr>
-          <a:lstStyle/>
-          <a:p>
-            <a:r>
-              <a:rPr lang="en-US" sz="1800" b="1" dirty="0" smtClean="0"/>
-              <a:t>http://en.wikipedia.org/wiki/Unit_testing</a:t>
-            </a:r>
-            <a:endParaRPr lang="en-US" sz="1800" b="1" dirty="0"/>
-          </a:p>
-        </p:txBody>
-      </p:sp>
     </p:spTree>
     <p:extLst>
       <p:ext uri="{BB962C8B-B14F-4D97-AF65-F5344CB8AC3E}">
-        <p14:creationId xmlns:p14="http://schemas.microsoft.com/office/powerpoint/2010/main" val="4080939389"/>
+        <p14:creationId xmlns:p14="http://schemas.microsoft.com/office/powerpoint/2010/main" xmlns="" val="80246185"/>
       </p:ext>
     </p:extLst>
   </p:cSld>
@@ -10967,8 +11026,8 @@
         </p:nvSpPr>
         <p:spPr bwMode="auto">
           <a:xfrm>
-            <a:off x="457200" y="1600201"/>
-            <a:ext cx="7423150" cy="2514600"/>
+            <a:off x="457200" y="1600200"/>
+            <a:ext cx="7423150" cy="4724399"/>
           </a:xfrm>
           <a:prstGeom prst="rect">
             <a:avLst/>
@@ -10986,7 +11045,7 @@
             <a:prstTxWarp prst="textNoShape">
               <a:avLst/>
             </a:prstTxWarp>
-            <a:noAutofit/>
+            <a:normAutofit/>
           </a:bodyPr>
           <a:lstStyle>
             <a:lvl1pPr marL="342900" indent="-342900" algn="l" rtl="0" eaLnBrk="0" fontAlgn="base" hangingPunct="0">
@@ -11137,43 +11196,38 @@
             </a:pPr>
             <a:r>
               <a:rPr lang="en-US" sz="2400" smtClean="0"/>
-              <a:t>Unit testing helps you …</a:t>
+              <a:t>NUnit – www.nunit.org</a:t>
             </a:r>
           </a:p>
           <a:p>
             <a:pPr lvl="1"/>
             <a:r>
               <a:rPr lang="nb-NO" sz="2400" smtClean="0"/>
-              <a:t>Try before you buy</a:t>
+              <a:t>Unit testing framework for all .NET languages</a:t>
             </a:r>
           </a:p>
           <a:p>
             <a:pPr lvl="1"/>
             <a:r>
               <a:rPr lang="nb-NO" sz="2400" smtClean="0"/>
-              <a:t>Find bugs</a:t>
+              <a:t>Port of JUnit</a:t>
             </a:r>
           </a:p>
           <a:p>
             <a:pPr lvl="1"/>
             <a:r>
               <a:rPr lang="nb-NO" sz="2400" smtClean="0"/>
-              <a:t>Maintain the application</a:t>
-            </a:r>
-          </a:p>
-          <a:p>
-            <a:pPr lvl="1"/>
-            <a:r>
-              <a:rPr lang="nb-NO" sz="2400" smtClean="0"/>
-              <a:t>Understand and document the application</a:t>
-            </a:r>
-          </a:p>
-          <a:p>
-            <a:pPr lvl="1"/>
-            <a:r>
-              <a:rPr lang="en-US" sz="2400" smtClean="0"/>
-              <a:t>Develop new pieces for the application</a:t>
-            </a:r>
+              <a:t>Built entirely in C# to take full advantage of CLR features</a:t>
+            </a:r>
+            <a:endParaRPr lang="en-US" sz="2400" smtClean="0"/>
+          </a:p>
+          <a:p>
+            <a:pPr>
+              <a:lnSpc>
+                <a:spcPct val="90000"/>
+              </a:lnSpc>
+            </a:pPr>
+            <a:endParaRPr lang="en-US" sz="2400" smtClean="0"/>
           </a:p>
           <a:p>
             <a:pPr lvl="2">
@@ -11183,6 +11237,16 @@
               <a:buFont typeface="Arial" pitchFamily="34" charset="0"/>
               <a:buChar char="•"/>
             </a:pPr>
+            <a:endParaRPr lang="en-US" smtClean="0"/>
+          </a:p>
+          <a:p>
+            <a:pPr lvl="2">
+              <a:lnSpc>
+                <a:spcPct val="90000"/>
+              </a:lnSpc>
+              <a:buFont typeface="Arial" pitchFamily="34" charset="0"/>
+              <a:buChar char="•"/>
+            </a:pPr>
             <a:endParaRPr lang="en-US" dirty="0" smtClean="0"/>
           </a:p>
         </p:txBody>
@@ -11190,7 +11254,7 @@
     </p:spTree>
     <p:extLst>
       <p:ext uri="{BB962C8B-B14F-4D97-AF65-F5344CB8AC3E}">
-        <p14:creationId xmlns:p14="http://schemas.microsoft.com/office/powerpoint/2010/main" val="80246185"/>
+        <p14:creationId xmlns:p14="http://schemas.microsoft.com/office/powerpoint/2010/main" xmlns="" val="1508998401"/>
       </p:ext>
     </p:extLst>
   </p:cSld>
@@ -11493,7 +11557,7 @@
     </p:spTree>
     <p:extLst>
       <p:ext uri="{BB962C8B-B14F-4D97-AF65-F5344CB8AC3E}">
-        <p14:creationId xmlns:p14="http://schemas.microsoft.com/office/powerpoint/2010/main" val="3898730219"/>
+        <p14:creationId xmlns:p14="http://schemas.microsoft.com/office/powerpoint/2010/main" xmlns="" val="3898730219"/>
       </p:ext>
     </p:extLst>
   </p:cSld>
@@ -11754,22 +11818,29 @@
             <a:pPr lvl="1"/>
             <a:r>
               <a:rPr lang="nb-NO" sz="2400" smtClean="0"/>
-              <a:t>Unit testing framework for all .NET languages</a:t>
+              <a:t>Understand and document the application</a:t>
             </a:r>
           </a:p>
           <a:p>
             <a:pPr lvl="1"/>
             <a:r>
-              <a:rPr lang="nb-NO" sz="2400" smtClean="0"/>
-              <a:t>Port of JUnit</a:t>
+              <a:rPr lang="en-US" sz="2400" smtClean="0"/>
+              <a:t>Develop new pieces for the application</a:t>
             </a:r>
           </a:p>
           <a:p>
             <a:pPr lvl="1"/>
             <a:r>
-              <a:rPr lang="nb-NO" sz="2400" smtClean="0"/>
-              <a:t>Built entirely in C# to take full advantage of CLR features</a:t>
-            </a:r>
+              <a:rPr lang="en-US" sz="2400" smtClean="0"/>
+              <a:t>Provides a great way to write, run and review test results</a:t>
+            </a:r>
+          </a:p>
+          <a:p>
+            <a:pPr lvl="1">
+              <a:lnSpc>
+                <a:spcPct val="90000"/>
+              </a:lnSpc>
+            </a:pPr>
             <a:endParaRPr lang="en-US" sz="2400" smtClean="0"/>
           </a:p>
           <a:p>
@@ -11805,7 +11876,7 @@
     </p:spTree>
     <p:extLst>
       <p:ext uri="{BB962C8B-B14F-4D97-AF65-F5344CB8AC3E}">
-        <p14:creationId xmlns:p14="http://schemas.microsoft.com/office/powerpoint/2010/main" val="1508998401"/>
+        <p14:creationId xmlns:p14="http://schemas.microsoft.com/office/powerpoint/2010/main" xmlns="" val="1009904848"/>
       </p:ext>
     </p:extLst>
   </p:cSld>
@@ -11874,7 +11945,7 @@
             </a:pPr>
             <a:r>
               <a:rPr lang="en-US" dirty="0" smtClean="0"/>
-              <a:t>Testing Tooling</a:t>
+              <a:t>Demo</a:t>
             </a:r>
           </a:p>
         </p:txBody>
@@ -11889,8 +11960,8 @@
         </p:nvSpPr>
         <p:spPr bwMode="auto">
           <a:xfrm>
-            <a:off x="457200" y="1600200"/>
-            <a:ext cx="7423150" cy="4724399"/>
+            <a:off x="533400" y="3140075"/>
+            <a:ext cx="7924800" cy="577850"/>
           </a:xfrm>
           <a:prstGeom prst="rect">
             <a:avLst/>
@@ -11904,11 +11975,11 @@
           </a:ln>
         </p:spPr>
         <p:txBody>
-          <a:bodyPr vert="horz" wrap="square" lIns="91440" tIns="45720" rIns="91440" bIns="45720" numCol="1" anchor="t" anchorCtr="0" compatLnSpc="1">
+          <a:bodyPr vert="horz" wrap="square" lIns="91440" tIns="45720" rIns="91440" bIns="45720" numCol="1" anchor="ctr" anchorCtr="0" compatLnSpc="1">
             <a:prstTxWarp prst="textNoShape">
               <a:avLst/>
             </a:prstTxWarp>
-            <a:normAutofit/>
+            <a:normAutofit lnSpcReduction="10000"/>
           </a:bodyPr>
           <a:lstStyle>
             <a:lvl1pPr marL="342900" indent="-342900" algn="l" rtl="0" eaLnBrk="0" fontAlgn="base" hangingPunct="0">
@@ -12052,71 +12123,14 @@
             </a:lvl9pPr>
           </a:lstStyle>
           <a:p>
-            <a:pPr>
-              <a:lnSpc>
-                <a:spcPct val="90000"/>
-              </a:lnSpc>
-            </a:pPr>
-            <a:r>
-              <a:rPr lang="en-US" sz="2400" smtClean="0"/>
-              <a:t>NUnit – www.nunit.org</a:t>
-            </a:r>
-          </a:p>
-          <a:p>
-            <a:pPr lvl="1"/>
-            <a:r>
-              <a:rPr lang="nb-NO" sz="2400" smtClean="0"/>
-              <a:t>Understand and document the application</a:t>
-            </a:r>
-          </a:p>
-          <a:p>
-            <a:pPr lvl="1"/>
-            <a:r>
-              <a:rPr lang="en-US" sz="2400" smtClean="0"/>
-              <a:t>Develop new pieces for the application</a:t>
-            </a:r>
-          </a:p>
-          <a:p>
-            <a:pPr lvl="1"/>
-            <a:r>
-              <a:rPr lang="en-US" sz="2400" smtClean="0"/>
-              <a:t>Provides a great way to write, run and review test results</a:t>
-            </a:r>
-          </a:p>
-          <a:p>
-            <a:pPr lvl="1">
-              <a:lnSpc>
-                <a:spcPct val="90000"/>
-              </a:lnSpc>
-            </a:pPr>
-            <a:endParaRPr lang="en-US" sz="2400" smtClean="0"/>
-          </a:p>
-          <a:p>
-            <a:pPr>
-              <a:lnSpc>
-                <a:spcPct val="90000"/>
-              </a:lnSpc>
-            </a:pPr>
-            <a:endParaRPr lang="en-US" sz="2400" smtClean="0"/>
-          </a:p>
-          <a:p>
-            <a:pPr lvl="2">
-              <a:lnSpc>
-                <a:spcPct val="90000"/>
-              </a:lnSpc>
-              <a:buFont typeface="Arial" pitchFamily="34" charset="0"/>
-              <a:buChar char="•"/>
-            </a:pPr>
-            <a:endParaRPr lang="en-US" smtClean="0"/>
-          </a:p>
-          <a:p>
-            <a:pPr lvl="2">
-              <a:lnSpc>
-                <a:spcPct val="90000"/>
-              </a:lnSpc>
-              <a:buFont typeface="Arial" pitchFamily="34" charset="0"/>
-              <a:buChar char="•"/>
-            </a:pPr>
+            <a:pPr algn="ctr">
+              <a:buFont typeface="Wingdings" pitchFamily="-64" charset="2"/>
+              <a:buNone/>
+            </a:pPr>
+            <a:r>
+              <a:rPr lang="en-US" smtClean="0"/>
+              <a:t>Nunit (with RhinoMocks) Overview</a:t>
+            </a:r>
             <a:endParaRPr lang="en-US" dirty="0" smtClean="0"/>
           </a:p>
         </p:txBody>
@@ -12124,7 +12138,7 @@
     </p:spTree>
     <p:extLst>
       <p:ext uri="{BB962C8B-B14F-4D97-AF65-F5344CB8AC3E}">
-        <p14:creationId xmlns:p14="http://schemas.microsoft.com/office/powerpoint/2010/main" val="1009904848"/>
+        <p14:creationId xmlns:p14="http://schemas.microsoft.com/office/powerpoint/2010/main" xmlns="" val="2716298368"/>
       </p:ext>
     </p:extLst>
   </p:cSld>
@@ -12193,7 +12207,7 @@
             </a:pPr>
             <a:r>
               <a:rPr lang="en-US" dirty="0" smtClean="0"/>
-              <a:t>Demo</a:t>
+              <a:t>Recap</a:t>
             </a:r>
           </a:p>
         </p:txBody>
@@ -12208,8 +12222,8 @@
         </p:nvSpPr>
         <p:spPr bwMode="auto">
           <a:xfrm>
-            <a:off x="533400" y="3140075"/>
-            <a:ext cx="7924800" cy="577850"/>
+            <a:off x="457200" y="1600200"/>
+            <a:ext cx="7781925" cy="4525963"/>
           </a:xfrm>
           <a:prstGeom prst="rect">
             <a:avLst/>
@@ -12223,11 +12237,11 @@
           </a:ln>
         </p:spPr>
         <p:txBody>
-          <a:bodyPr vert="horz" wrap="square" lIns="91440" tIns="45720" rIns="91440" bIns="45720" numCol="1" anchor="ctr" anchorCtr="0" compatLnSpc="1">
+          <a:bodyPr vert="horz" wrap="square" lIns="91440" tIns="45720" rIns="91440" bIns="45720" numCol="1" anchor="t" anchorCtr="0" compatLnSpc="1">
             <a:prstTxWarp prst="textNoShape">
               <a:avLst/>
             </a:prstTxWarp>
-            <a:normAutofit lnSpcReduction="10000"/>
+            <a:normAutofit/>
           </a:bodyPr>
           <a:lstStyle>
             <a:lvl1pPr marL="342900" indent="-342900" algn="l" rtl="0" eaLnBrk="0" fontAlgn="base" hangingPunct="0">
@@ -12371,22 +12385,52 @@
             </a:lvl9pPr>
           </a:lstStyle>
           <a:p>
-            <a:pPr algn="ctr">
-              <a:buFont typeface="Wingdings" pitchFamily="-64" charset="2"/>
-              <a:buNone/>
-            </a:pPr>
-            <a:r>
-              <a:rPr lang="en-US" smtClean="0"/>
-              <a:t>Nunit (with RhinoMocks) Overview</a:t>
-            </a:r>
-            <a:endParaRPr lang="en-US" dirty="0" smtClean="0"/>
+            <a:pPr>
+              <a:lnSpc>
+                <a:spcPct val="90000"/>
+              </a:lnSpc>
+            </a:pPr>
+            <a:r>
+              <a:rPr lang="en-US" sz="2400" smtClean="0"/>
+              <a:t>Learn to leverage tooling for your product</a:t>
+            </a:r>
+          </a:p>
+          <a:p>
+            <a:pPr>
+              <a:lnSpc>
+                <a:spcPct val="90000"/>
+              </a:lnSpc>
+            </a:pPr>
+            <a:r>
+              <a:rPr lang="en-US" sz="2400" smtClean="0"/>
+              <a:t>No need to re-invent the wheel</a:t>
+            </a:r>
+          </a:p>
+          <a:p>
+            <a:pPr>
+              <a:lnSpc>
+                <a:spcPct val="90000"/>
+              </a:lnSpc>
+            </a:pPr>
+            <a:r>
+              <a:rPr lang="en-US" sz="2400" smtClean="0"/>
+              <a:t>Build for testability and you get flexibility for free</a:t>
+            </a:r>
+          </a:p>
+          <a:p>
+            <a:pPr>
+              <a:lnSpc>
+                <a:spcPct val="90000"/>
+              </a:lnSpc>
+            </a:pPr>
+            <a:endParaRPr lang="en-US" sz="2400" dirty="0" smtClean="0"/>
           </a:p>
         </p:txBody>
       </p:sp>
     </p:spTree>
     <p:extLst>
       <p:ext uri="{BB962C8B-B14F-4D97-AF65-F5344CB8AC3E}">
-        <p14:creationId xmlns:p14="http://schemas.microsoft.com/office/powerpoint/2010/main" val="2716298368"/>
+        <p14:creationId xmlns:p14="http://schemas.microsoft.com/office/powerpoint/2010/main" xmlns="" val="4262635975"/>
       </p:ext>
     </p:extLst>
   </p:cSld>
@@ -12455,7 +12499,7 @@
             </a:pPr>
             <a:r>
               <a:rPr lang="en-US" dirty="0" smtClean="0"/>
-              <a:t>Recap</a:t>
+              <a:t>Questions?</a:t>
             </a:r>
           </a:p>
         </p:txBody>
@@ -12470,8 +12514,8 @@
         </p:nvSpPr>
         <p:spPr bwMode="auto">
           <a:xfrm>
-            <a:off x="457200" y="1600200"/>
-            <a:ext cx="7781925" cy="4525963"/>
+            <a:off x="1628775" y="3140075"/>
+            <a:ext cx="6230938" cy="577850"/>
           </a:xfrm>
           <a:prstGeom prst="rect">
             <a:avLst/>
@@ -12485,11 +12529,11 @@
           </a:ln>
         </p:spPr>
         <p:txBody>
-          <a:bodyPr vert="horz" wrap="square" lIns="91440" tIns="45720" rIns="91440" bIns="45720" numCol="1" anchor="t" anchorCtr="0" compatLnSpc="1">
+          <a:bodyPr vert="horz" wrap="square" lIns="91440" tIns="45720" rIns="91440" bIns="45720" numCol="1" anchor="ctr" anchorCtr="0" compatLnSpc="1">
             <a:prstTxWarp prst="textNoShape">
               <a:avLst/>
             </a:prstTxWarp>
-            <a:normAutofit/>
+            <a:normAutofit lnSpcReduction="10000"/>
           </a:bodyPr>
           <a:lstStyle>
             <a:lvl1pPr marL="342900" indent="-342900" algn="l" rtl="0" eaLnBrk="0" fontAlgn="base" hangingPunct="0">
@@ -12633,52 +12677,22 @@
             </a:lvl9pPr>
           </a:lstStyle>
           <a:p>
-            <a:pPr>
-              <a:lnSpc>
-                <a:spcPct val="90000"/>
-              </a:lnSpc>
-            </a:pPr>
-            <a:r>
-              <a:rPr lang="en-US" sz="2400" smtClean="0"/>
-              <a:t>Learn to leverage tooling for your product</a:t>
-            </a:r>
-          </a:p>
-          <a:p>
-            <a:pPr>
-              <a:lnSpc>
-                <a:spcPct val="90000"/>
-              </a:lnSpc>
-            </a:pPr>
-            <a:r>
-              <a:rPr lang="en-US" sz="2400" smtClean="0"/>
-              <a:t>No need to re-invent the wheel</a:t>
-            </a:r>
-          </a:p>
-          <a:p>
-            <a:pPr>
-              <a:lnSpc>
-                <a:spcPct val="90000"/>
-              </a:lnSpc>
-            </a:pPr>
-            <a:r>
-              <a:rPr lang="en-US" sz="2400" smtClean="0"/>
-              <a:t>Build for testability and you get flexibility for free</a:t>
-            </a:r>
-          </a:p>
-          <a:p>
-            <a:pPr>
-              <a:lnSpc>
-                <a:spcPct val="90000"/>
-              </a:lnSpc>
-            </a:pPr>
-            <a:endParaRPr lang="en-US" sz="2400" dirty="0" smtClean="0"/>
+            <a:pPr algn="ctr">
+              <a:buFont typeface="Wingdings" pitchFamily="-64" charset="2"/>
+              <a:buNone/>
+            </a:pPr>
+            <a:r>
+              <a:rPr lang="en-US" smtClean="0"/>
+              <a:t>Clear as mud?</a:t>
+            </a:r>
+            <a:endParaRPr lang="en-US" dirty="0" smtClean="0"/>
           </a:p>
         </p:txBody>
       </p:sp>
     </p:spTree>
     <p:extLst>
       <p:ext uri="{BB962C8B-B14F-4D97-AF65-F5344CB8AC3E}">
-        <p14:creationId xmlns:p14="http://schemas.microsoft.com/office/powerpoint/2010/main" val="4262635975"/>
+        <p14:creationId xmlns:p14="http://schemas.microsoft.com/office/powerpoint/2010/main" xmlns="" val="2702593119"/>
       </p:ext>
     </p:extLst>
   </p:cSld>
@@ -12714,268 +12728,6 @@
       </p:grpSpPr>
       <p:sp>
         <p:nvSpPr>
-          <p:cNvPr id="4" name="Rectangle 2"/>
-          <p:cNvSpPr>
-            <a:spLocks noGrp="1" noChangeArrowheads="1"/>
-          </p:cNvSpPr>
-          <p:nvPr>
-            <p:ph type="title"/>
-          </p:nvPr>
-        </p:nvSpPr>
-        <p:spPr bwMode="auto">
-          <a:xfrm>
-            <a:off x="665163" y="395288"/>
-            <a:ext cx="7813675" cy="609600"/>
-          </a:xfrm>
-          <a:ln>
-            <a:noFill/>
-            <a:miter lim="800000"/>
-            <a:headEnd/>
-            <a:tailEnd/>
-          </a:ln>
-        </p:spPr>
-        <p:txBody>
-          <a:bodyPr vert="horz" wrap="square" lIns="91440" tIns="45720" rIns="91440" bIns="45720" numCol="1" anchor="t" anchorCtr="0" compatLnSpc="1">
-            <a:prstTxWarp prst="textNoShape">
-              <a:avLst/>
-            </a:prstTxWarp>
-          </a:bodyPr>
-          <a:lstStyle/>
-          <a:p>
-            <a:pPr algn="r">
-              <a:defRPr/>
-            </a:pPr>
-            <a:r>
-              <a:rPr lang="en-US" dirty="0" smtClean="0"/>
-              <a:t>Questions?</a:t>
-            </a:r>
-          </a:p>
-        </p:txBody>
-      </p:sp>
-      <p:sp>
-        <p:nvSpPr>
-          <p:cNvPr id="5" name="Text Placeholder 2"/>
-          <p:cNvSpPr txBox="1">
-            <a:spLocks/>
-          </p:cNvSpPr>
-          <p:nvPr/>
-        </p:nvSpPr>
-        <p:spPr bwMode="auto">
-          <a:xfrm>
-            <a:off x="1628775" y="3140075"/>
-            <a:ext cx="6230938" cy="577850"/>
-          </a:xfrm>
-          <a:prstGeom prst="rect">
-            <a:avLst/>
-          </a:prstGeom>
-          <a:noFill/>
-          <a:ln w="9525">
-            <a:noFill/>
-            <a:miter lim="800000"/>
-            <a:headEnd/>
-            <a:tailEnd/>
-          </a:ln>
-        </p:spPr>
-        <p:txBody>
-          <a:bodyPr vert="horz" wrap="square" lIns="91440" tIns="45720" rIns="91440" bIns="45720" numCol="1" anchor="ctr" anchorCtr="0" compatLnSpc="1">
-            <a:prstTxWarp prst="textNoShape">
-              <a:avLst/>
-            </a:prstTxWarp>
-            <a:normAutofit lnSpcReduction="10000"/>
-          </a:bodyPr>
-          <a:lstStyle>
-            <a:lvl1pPr marL="342900" indent="-342900" algn="l" rtl="0" eaLnBrk="0" fontAlgn="base" hangingPunct="0">
-              <a:spcBef>
-                <a:spcPct val="20000"/>
-              </a:spcBef>
-              <a:spcAft>
-                <a:spcPct val="0"/>
-              </a:spcAft>
-              <a:buChar char="•"/>
-              <a:defRPr sz="3200">
-                <a:solidFill>
-                  <a:srgbClr val="FFFF66"/>
-                </a:solidFill>
-                <a:latin typeface="+mn-lt"/>
-                <a:ea typeface="+mn-ea"/>
-                <a:cs typeface="+mn-cs"/>
-              </a:defRPr>
-            </a:lvl1pPr>
-            <a:lvl2pPr marL="742950" indent="-285750" algn="l" rtl="0" eaLnBrk="0" fontAlgn="base" hangingPunct="0">
-              <a:spcBef>
-                <a:spcPct val="20000"/>
-              </a:spcBef>
-              <a:spcAft>
-                <a:spcPct val="0"/>
-              </a:spcAft>
-              <a:buSzPct val="75000"/>
-              <a:buFont typeface="Arial" charset="0"/>
-              <a:buChar char="●"/>
-              <a:defRPr sz="2800">
-                <a:solidFill>
-                  <a:schemeClr val="tx1"/>
-                </a:solidFill>
-                <a:latin typeface="+mn-lt"/>
-              </a:defRPr>
-            </a:lvl2pPr>
-            <a:lvl3pPr marL="1143000" indent="-228600" algn="l" rtl="0" eaLnBrk="0" fontAlgn="base" hangingPunct="0">
-              <a:spcBef>
-                <a:spcPct val="20000"/>
-              </a:spcBef>
-              <a:spcAft>
-                <a:spcPct val="0"/>
-              </a:spcAft>
-              <a:buChar char="•"/>
-              <a:defRPr sz="2400">
-                <a:solidFill>
-                  <a:srgbClr val="FFFF66"/>
-                </a:solidFill>
-                <a:latin typeface="+mn-lt"/>
-              </a:defRPr>
-            </a:lvl3pPr>
-            <a:lvl4pPr marL="1600200" indent="-228600" algn="l" rtl="0" eaLnBrk="0" fontAlgn="base" hangingPunct="0">
-              <a:spcBef>
-                <a:spcPct val="20000"/>
-              </a:spcBef>
-              <a:spcAft>
-                <a:spcPct val="0"/>
-              </a:spcAft>
-              <a:buChar char="–"/>
-              <a:defRPr sz="2000">
-                <a:solidFill>
-                  <a:schemeClr val="tx1"/>
-                </a:solidFill>
-                <a:latin typeface="+mn-lt"/>
-              </a:defRPr>
-            </a:lvl4pPr>
-            <a:lvl5pPr marL="2057400" indent="-228600" algn="l" rtl="0" eaLnBrk="0" fontAlgn="base" hangingPunct="0">
-              <a:spcBef>
-                <a:spcPct val="20000"/>
-              </a:spcBef>
-              <a:spcAft>
-                <a:spcPct val="0"/>
-              </a:spcAft>
-              <a:buChar char="»"/>
-              <a:defRPr sz="2000">
-                <a:solidFill>
-                  <a:srgbClr val="FFFF66"/>
-                </a:solidFill>
-                <a:latin typeface="+mn-lt"/>
-              </a:defRPr>
-            </a:lvl5pPr>
-            <a:lvl6pPr marL="2514600" indent="-228600" algn="l" rtl="0" fontAlgn="base">
-              <a:spcBef>
-                <a:spcPct val="20000"/>
-              </a:spcBef>
-              <a:spcAft>
-                <a:spcPct val="0"/>
-              </a:spcAft>
-              <a:buChar char="»"/>
-              <a:defRPr sz="2000">
-                <a:solidFill>
-                  <a:srgbClr val="FFFF66"/>
-                </a:solidFill>
-                <a:latin typeface="+mn-lt"/>
-              </a:defRPr>
-            </a:lvl6pPr>
-            <a:lvl7pPr marL="2971800" indent="-228600" algn="l" rtl="0" fontAlgn="base">
-              <a:spcBef>
-                <a:spcPct val="20000"/>
-              </a:spcBef>
-              <a:spcAft>
-                <a:spcPct val="0"/>
-              </a:spcAft>
-              <a:buChar char="»"/>
-              <a:defRPr sz="2000">
-                <a:solidFill>
-                  <a:srgbClr val="FFFF66"/>
-                </a:solidFill>
-                <a:latin typeface="+mn-lt"/>
-              </a:defRPr>
-            </a:lvl7pPr>
-            <a:lvl8pPr marL="3429000" indent="-228600" algn="l" rtl="0" fontAlgn="base">
-              <a:spcBef>
-                <a:spcPct val="20000"/>
-              </a:spcBef>
-              <a:spcAft>
-                <a:spcPct val="0"/>
-              </a:spcAft>
-              <a:buChar char="»"/>
-              <a:defRPr sz="2000">
-                <a:solidFill>
-                  <a:srgbClr val="FFFF66"/>
-                </a:solidFill>
-                <a:latin typeface="+mn-lt"/>
-              </a:defRPr>
-            </a:lvl8pPr>
-            <a:lvl9pPr marL="3886200" indent="-228600" algn="l" rtl="0" fontAlgn="base">
-              <a:spcBef>
-                <a:spcPct val="20000"/>
-              </a:spcBef>
-              <a:spcAft>
-                <a:spcPct val="0"/>
-              </a:spcAft>
-              <a:buChar char="»"/>
-              <a:defRPr sz="2000">
-                <a:solidFill>
-                  <a:srgbClr val="FFFF66"/>
-                </a:solidFill>
-                <a:latin typeface="+mn-lt"/>
-              </a:defRPr>
-            </a:lvl9pPr>
-          </a:lstStyle>
-          <a:p>
-            <a:pPr algn="ctr">
-              <a:buFont typeface="Wingdings" pitchFamily="-64" charset="2"/>
-              <a:buNone/>
-            </a:pPr>
-            <a:r>
-              <a:rPr lang="en-US" smtClean="0"/>
-              <a:t>Clear as mud?</a:t>
-            </a:r>
-            <a:endParaRPr lang="en-US" dirty="0" smtClean="0"/>
-          </a:p>
-        </p:txBody>
-      </p:sp>
-    </p:spTree>
-    <p:extLst>
-      <p:ext uri="{BB962C8B-B14F-4D97-AF65-F5344CB8AC3E}">
-        <p14:creationId xmlns:p14="http://schemas.microsoft.com/office/powerpoint/2010/main" val="2702593119"/>
-      </p:ext>
-    </p:extLst>
-  </p:cSld>
-  <p:clrMapOvr>
-    <a:masterClrMapping/>
-  </p:clrMapOvr>
-  <p:timing>
-    <p:tnLst>
-      <p:par>
-        <p:cTn id="1" dur="indefinite" restart="never" nodeType="tmRoot"/>
-      </p:par>
-    </p:tnLst>
-  </p:timing>
-</p:sld>
-</file>
-
-<file path=ppt/slides/slide35.xml><?xml version="1.0" encoding="utf-8"?>
-<p:sld xmlns:a="http://schemas.openxmlformats.org/drawingml/2006/main" xmlns:r="http://schemas.openxmlformats.org/officeDocument/2006/relationships" xmlns:p="http://schemas.openxmlformats.org/presentationml/2006/main">
-  <p:cSld>
-    <p:spTree>
-      <p:nvGrpSpPr>
-        <p:cNvPr id="1" name=""/>
-        <p:cNvGrpSpPr/>
-        <p:nvPr/>
-      </p:nvGrpSpPr>
-      <p:grpSpPr>
-        <a:xfrm>
-          <a:off x="0" y="0"/>
-          <a:ext cx="0" cy="0"/>
-          <a:chOff x="0" y="0"/>
-          <a:chExt cx="0" cy="0"/>
-        </a:xfrm>
-      </p:grpSpPr>
-      <p:sp>
-        <p:nvSpPr>
           <p:cNvPr id="4098" name="Rectangle 2"/>
           <p:cNvSpPr>
             <a:spLocks noGrp="1" noChangeArrowheads="1"/>
@@ -13043,7 +12795,7 @@
     </p:spTree>
     <p:extLst>
       <p:ext uri="{BB962C8B-B14F-4D97-AF65-F5344CB8AC3E}">
-        <p14:creationId xmlns:p14="http://schemas.microsoft.com/office/powerpoint/2010/main" val="642885405"/>
+        <p14:creationId xmlns:p14="http://schemas.microsoft.com/office/powerpoint/2010/main" xmlns="" val="642885405"/>
       </p:ext>
     </p:extLst>
   </p:cSld>
@@ -13200,6 +12952,18 @@
                 <a:spcPct val="90000"/>
               </a:lnSpc>
             </a:pPr>
+            <a:r>
+              <a:rPr lang="en-US" sz="2400" dirty="0" smtClean="0"/>
+              <a:t>MVC Turbine</a:t>
+            </a:r>
+            <a:endParaRPr lang="en-US" sz="2400" dirty="0" smtClean="0"/>
+          </a:p>
+          <a:p>
+            <a:pPr>
+              <a:lnSpc>
+                <a:spcPct val="90000"/>
+              </a:lnSpc>
+            </a:pPr>
             <a:endParaRPr lang="en-US" sz="2400" dirty="0" smtClean="0"/>
           </a:p>
         </p:txBody>
@@ -13300,10 +13064,34 @@
           </a:ln>
         </p:spPr>
       </p:pic>
+      <p:pic>
+        <p:nvPicPr>
+          <p:cNvPr id="7" name="Picture 6" descr="full-logo-large.png"/>
+          <p:cNvPicPr>
+            <a:picLocks noChangeAspect="1"/>
+          </p:cNvPicPr>
+          <p:nvPr/>
+        </p:nvPicPr>
+        <p:blipFill>
+          <a:blip r:embed="rId6" cstate="print"/>
+          <a:stretch>
+            <a:fillRect/>
+          </a:stretch>
+        </p:blipFill>
+        <p:spPr>
+          <a:xfrm>
+            <a:off x="5562600" y="4800600"/>
+            <a:ext cx="2848373" cy="943107"/>
+          </a:xfrm>
+          <a:prstGeom prst="rect">
+            <a:avLst/>
+          </a:prstGeom>
+        </p:spPr>
+      </p:pic>
     </p:spTree>
     <p:extLst>
       <p:ext uri="{BB962C8B-B14F-4D97-AF65-F5344CB8AC3E}">
-        <p14:creationId xmlns:p14="http://schemas.microsoft.com/office/powerpoint/2010/main" val="3932559410"/>
+        <p14:creationId xmlns:p14="http://schemas.microsoft.com/office/powerpoint/2010/main" xmlns="" val="3932559410"/>
       </p:ext>
     </p:extLst>
   </p:cSld>
@@ -13425,20 +13213,15 @@
           <a:p>
             <a:r>
               <a:rPr lang="en-US" sz="2400" dirty="0" smtClean="0"/>
-              <a:t>Code:   http://</a:t>
-            </a:r>
-            <a:r>
-              <a:rPr lang="en-US" sz="2400" dirty="0" smtClean="0"/>
-              <a:t>github.com/lozanotek/opensource</a:t>
-            </a:r>
-            <a:endParaRPr lang="en-US" sz="2400" dirty="0" smtClean="0"/>
+              <a:t>Code:   http://github.com/lozanotek/opensource</a:t>
+            </a:r>
           </a:p>
         </p:txBody>
       </p:sp>
     </p:spTree>
     <p:extLst>
       <p:ext uri="{BB962C8B-B14F-4D97-AF65-F5344CB8AC3E}">
-        <p14:creationId xmlns:p14="http://schemas.microsoft.com/office/powerpoint/2010/main" val="2495706370"/>
+        <p14:creationId xmlns:p14="http://schemas.microsoft.com/office/powerpoint/2010/main" xmlns="" val="2495706370"/>
       </p:ext>
     </p:extLst>
   </p:cSld>
@@ -13720,7 +13503,7 @@
     </p:spTree>
     <p:extLst>
       <p:ext uri="{BB962C8B-B14F-4D97-AF65-F5344CB8AC3E}">
-        <p14:creationId xmlns:p14="http://schemas.microsoft.com/office/powerpoint/2010/main" val="1175031603"/>
+        <p14:creationId xmlns:p14="http://schemas.microsoft.com/office/powerpoint/2010/main" xmlns="" val="1175031603"/>
       </p:ext>
     </p:extLst>
   </p:cSld>
@@ -14213,7 +13996,7 @@
         </p:nvSpPr>
         <p:spPr>
           <a:xfrm>
-            <a:off x="2057400" y="5791200"/>
+            <a:off x="533400" y="5867400"/>
             <a:ext cx="5773760" cy="369332"/>
           </a:xfrm>
           <a:prstGeom prst="rect">
@@ -14238,7 +14021,7 @@
     </p:spTree>
     <p:extLst>
       <p:ext uri="{BB962C8B-B14F-4D97-AF65-F5344CB8AC3E}">
-        <p14:creationId xmlns:p14="http://schemas.microsoft.com/office/powerpoint/2010/main" val="1753499069"/>
+        <p14:creationId xmlns:p14="http://schemas.microsoft.com/office/powerpoint/2010/main" xmlns="" val="1753499069"/>
       </p:ext>
     </p:extLst>
   </p:cSld>
@@ -14900,13 +14683,13 @@
           </a:lstStyle>
           <a:p>
             <a:r>
-              <a:rPr lang="en-US" sz="2400" smtClean="0"/>
+              <a:rPr lang="en-US" sz="2400" dirty="0" smtClean="0"/>
               <a:t>Non-partisan</a:t>
             </a:r>
           </a:p>
           <a:p>
             <a:r>
-              <a:rPr lang="en-US" sz="2400" smtClean="0"/>
+              <a:rPr lang="en-US" sz="2400" dirty="0" smtClean="0"/>
               <a:t>For developers, by developers</a:t>
             </a:r>
           </a:p>
@@ -14917,7 +14700,7 @@
               </a:lnSpc>
             </a:pPr>
             <a:r>
-              <a:rPr lang="en-US" sz="2400" smtClean="0"/>
+              <a:rPr lang="en-US" sz="2400" dirty="0" smtClean="0"/>
               <a:t>Always evolving</a:t>
             </a:r>
           </a:p>
@@ -14928,25 +14711,29 @@
               </a:lnSpc>
             </a:pPr>
             <a:r>
-              <a:rPr lang="en-US" sz="2400" smtClean="0"/>
-              <a:t>Often more releases than commercial software</a:t>
-            </a:r>
-          </a:p>
-          <a:p>
-            <a:r>
-              <a:rPr lang="en-US" sz="2400" smtClean="0"/>
+              <a:rPr lang="en-US" sz="2400" dirty="0" smtClean="0"/>
+              <a:t>Often more releases than commercial </a:t>
+            </a:r>
+            <a:r>
+              <a:rPr lang="en-US" sz="2400" dirty="0" smtClean="0"/>
+              <a:t>software</a:t>
+            </a:r>
+          </a:p>
+          <a:p>
+            <a:r>
+              <a:rPr lang="en-US" sz="2400" dirty="0" smtClean="0"/>
               <a:t>Transparency</a:t>
             </a:r>
           </a:p>
           <a:p>
             <a:r>
-              <a:rPr lang="en-US" sz="2400" smtClean="0"/>
+              <a:rPr lang="en-US" sz="2400" dirty="0" smtClean="0"/>
               <a:t>Free source and samples</a:t>
             </a:r>
           </a:p>
           <a:p>
             <a:r>
-              <a:rPr lang="en-US" sz="2400" smtClean="0"/>
+              <a:rPr lang="en-US" sz="2400" dirty="0" smtClean="0"/>
               <a:t>Strong community</a:t>
             </a:r>
           </a:p>
@@ -14962,7 +14749,7 @@
     </p:spTree>
     <p:extLst>
       <p:ext uri="{BB962C8B-B14F-4D97-AF65-F5344CB8AC3E}">
-        <p14:creationId xmlns:p14="http://schemas.microsoft.com/office/powerpoint/2010/main" val="3463921396"/>
+        <p14:creationId xmlns:p14="http://schemas.microsoft.com/office/powerpoint/2010/main" xmlns="" val="3463921396"/>
       </p:ext>
     </p:extLst>
   </p:cSld>
@@ -15210,26 +14997,30 @@
           </a:lstStyle>
           <a:p>
             <a:r>
-              <a:rPr lang="en-US" sz="2400" smtClean="0"/>
+              <a:rPr lang="en-US" sz="2400" dirty="0" smtClean="0"/>
               <a:t>Previous Investments</a:t>
             </a:r>
           </a:p>
           <a:p>
             <a:r>
-              <a:rPr lang="en-US" sz="2400" smtClean="0"/>
+              <a:rPr lang="en-US" sz="2400" dirty="0" smtClean="0"/>
               <a:t>NO “Guarantee on the box”</a:t>
             </a:r>
           </a:p>
           <a:p>
             <a:r>
-              <a:rPr lang="en-US" sz="2400" smtClean="0"/>
+              <a:rPr lang="en-US" sz="2400" dirty="0" smtClean="0"/>
               <a:t>Corporate Standards</a:t>
             </a:r>
           </a:p>
           <a:p>
             <a:r>
-              <a:rPr lang="en-US" sz="2400" smtClean="0"/>
-              <a:t>Black Voodoo</a:t>
+              <a:rPr lang="en-US" sz="2400" dirty="0" smtClean="0"/>
+              <a:t>Black </a:t>
+            </a:r>
+            <a:r>
+              <a:rPr lang="en-US" sz="2400" dirty="0" smtClean="0"/>
+              <a:t>“Voodoo”</a:t>
             </a:r>
             <a:endParaRPr lang="en-US" sz="2400" dirty="0" smtClean="0"/>
           </a:p>
@@ -15238,7 +15029,7 @@
     </p:spTree>
     <p:extLst>
       <p:ext uri="{BB962C8B-B14F-4D97-AF65-F5344CB8AC3E}">
-        <p14:creationId xmlns:p14="http://schemas.microsoft.com/office/powerpoint/2010/main" val="2099704197"/>
+        <p14:creationId xmlns:p14="http://schemas.microsoft.com/office/powerpoint/2010/main" xmlns="" val="2099704197"/>
       </p:ext>
     </p:extLst>
   </p:cSld>

</xml_diff>